<commit_message>
Updated presentation for Feb 14
</commit_message>
<xml_diff>
--- a/documentation/slides/PresentationFeb14.pptx
+++ b/documentation/slides/PresentationFeb14.pptx
@@ -22,23 +22,24 @@
     <p:sldId id="267" r:id="rId16"/>
     <p:sldId id="268" r:id="rId17"/>
     <p:sldId id="269" r:id="rId18"/>
+    <p:sldId id="270" r:id="rId19"/>
   </p:sldIdLst>
   <p:sldSz cy="5143500" cx="9144000"/>
   <p:notesSz cx="6858000" cy="9144000"/>
   <p:embeddedFontLst>
     <p:embeddedFont>
       <p:font typeface="Montserrat"/>
-      <p:regular r:id="rId19"/>
-      <p:bold r:id="rId20"/>
-      <p:italic r:id="rId21"/>
-      <p:boldItalic r:id="rId22"/>
+      <p:regular r:id="rId20"/>
+      <p:bold r:id="rId21"/>
+      <p:italic r:id="rId22"/>
+      <p:boldItalic r:id="rId23"/>
     </p:embeddedFont>
     <p:embeddedFont>
       <p:font typeface="Lato"/>
-      <p:regular r:id="rId23"/>
-      <p:bold r:id="rId24"/>
-      <p:italic r:id="rId25"/>
-      <p:boldItalic r:id="rId26"/>
+      <p:regular r:id="rId24"/>
+      <p:bold r:id="rId25"/>
+      <p:italic r:id="rId26"/>
+      <p:boldItalic r:id="rId27"/>
     </p:embeddedFont>
   </p:embeddedFontLst>
   <p:defaultTextStyle>
@@ -1114,7 +1115,7 @@
       </p:grpSpPr>
       <p:sp>
         <p:nvSpPr>
-          <p:cNvPr id="212" name="Google Shape;212;g4e9aba5072_0_5:notes"/>
+          <p:cNvPr id="212" name="Google Shape;212;g4f10e51428_0_0:notes"/>
           <p:cNvSpPr/>
           <p:nvPr>
             <p:ph idx="2" type="sldImg"/>
@@ -1149,7 +1150,7 @@
       </p:sp>
       <p:sp>
         <p:nvSpPr>
-          <p:cNvPr id="213" name="Google Shape;213;g4e9aba5072_0_5:notes"/>
+          <p:cNvPr id="213" name="Google Shape;213;g4f10e51428_0_0:notes"/>
           <p:cNvSpPr txBox="1"/>
           <p:nvPr>
             <p:ph idx="1" type="body"/>
@@ -1180,8 +1181,7 @@
               <a:buNone/>
             </a:pPr>
             <a:r>
-              <a:rPr lang="en"/>
-              <a:t>Patti</a:t>
+              <a:t/>
             </a:r>
             <a:endParaRPr/>
           </a:p>
@@ -1200,7 +1200,7 @@
   <p:cSld>
     <p:spTree>
       <p:nvGrpSpPr>
-        <p:cNvPr id="219" name="Shape 219"/>
+        <p:cNvPr id="218" name="Shape 218"/>
         <p:cNvGrpSpPr/>
         <p:nvPr/>
       </p:nvGrpSpPr>
@@ -1214,7 +1214,7 @@
       </p:grpSpPr>
       <p:sp>
         <p:nvSpPr>
-          <p:cNvPr id="220" name="Google Shape;220;g4ebcf7c756_0_8:notes"/>
+          <p:cNvPr id="219" name="Google Shape;219;g4e9aba5072_0_5:notes"/>
           <p:cNvSpPr/>
           <p:nvPr>
             <p:ph idx="2" type="sldImg"/>
@@ -1249,7 +1249,107 @@
       </p:sp>
       <p:sp>
         <p:nvSpPr>
-          <p:cNvPr id="221" name="Google Shape;221;g4ebcf7c756_0_8:notes"/>
+          <p:cNvPr id="220" name="Google Shape;220;g4e9aba5072_0_5:notes"/>
+          <p:cNvSpPr txBox="1"/>
+          <p:nvPr>
+            <p:ph idx="1" type="body"/>
+          </p:nvPr>
+        </p:nvSpPr>
+        <p:spPr>
+          <a:xfrm>
+            <a:off x="685800" y="4343400"/>
+            <a:ext cx="5486400" cy="4114800"/>
+          </a:xfrm>
+          <a:prstGeom prst="rect">
+            <a:avLst/>
+          </a:prstGeom>
+        </p:spPr>
+        <p:txBody>
+          <a:bodyPr anchorCtr="0" anchor="t" bIns="91425" lIns="91425" spcFirstLastPara="1" rIns="91425" wrap="square" tIns="91425">
+            <a:noAutofit/>
+          </a:bodyPr>
+          <a:lstStyle/>
+          <a:p>
+            <a:pPr indent="0" lvl="0" marL="0" rtl="0" algn="l">
+              <a:spcBef>
+                <a:spcPts val="0"/>
+              </a:spcBef>
+              <a:spcAft>
+                <a:spcPts val="0"/>
+              </a:spcAft>
+              <a:buNone/>
+            </a:pPr>
+            <a:r>
+              <a:rPr lang="en"/>
+              <a:t>Patti</a:t>
+            </a:r>
+            <a:endParaRPr/>
+          </a:p>
+        </p:txBody>
+      </p:sp>
+    </p:spTree>
+  </p:cSld>
+  <p:clrMapOvr>
+    <a:masterClrMapping/>
+  </p:clrMapOvr>
+</p:notes>
+</file>
+
+<file path=ppt/notesSlides/notesSlide15.xml><?xml version="1.0" encoding="utf-8"?>
+<p:notes xmlns:a="http://schemas.openxmlformats.org/drawingml/2006/main" xmlns:r="http://schemas.openxmlformats.org/officeDocument/2006/relationships" xmlns:mc="http://schemas.openxmlformats.org/markup-compatibility/2006" xmlns:mv="urn:schemas-microsoft-com:mac:vml" xmlns:p="http://schemas.openxmlformats.org/presentationml/2006/main" xmlns:c="http://schemas.openxmlformats.org/drawingml/2006/chart" xmlns:dgm="http://schemas.openxmlformats.org/drawingml/2006/diagram" xmlns:o="urn:schemas-microsoft-com:office:office" xmlns:v="urn:schemas-microsoft-com:vml" xmlns:pvml="urn:schemas-microsoft-com:office:powerpoint" xmlns:com="http://schemas.openxmlformats.org/drawingml/2006/compatibility" xmlns:p14="http://schemas.microsoft.com/office/powerpoint/2010/main" xmlns:p15="http://schemas.microsoft.com/office/powerpoint/2012/main" showMasterPhAnim="0" showMasterSp="0">
+  <p:cSld>
+    <p:spTree>
+      <p:nvGrpSpPr>
+        <p:cNvPr id="226" name="Shape 226"/>
+        <p:cNvGrpSpPr/>
+        <p:nvPr/>
+      </p:nvGrpSpPr>
+      <p:grpSpPr>
+        <a:xfrm>
+          <a:off x="0" y="0"/>
+          <a:ext cx="0" cy="0"/>
+          <a:chOff x="0" y="0"/>
+          <a:chExt cx="0" cy="0"/>
+        </a:xfrm>
+      </p:grpSpPr>
+      <p:sp>
+        <p:nvSpPr>
+          <p:cNvPr id="227" name="Google Shape;227;g4ebcf7c756_0_8:notes"/>
+          <p:cNvSpPr/>
+          <p:nvPr>
+            <p:ph idx="2" type="sldImg"/>
+          </p:nvPr>
+        </p:nvSpPr>
+        <p:spPr>
+          <a:xfrm>
+            <a:off x="381300" y="685800"/>
+            <a:ext cx="6096000" cy="3429000"/>
+          </a:xfrm>
+          <a:custGeom>
+            <a:rect b="b" l="l" r="r" t="t"/>
+            <a:pathLst>
+              <a:path extrusionOk="0" h="120000" w="120000">
+                <a:moveTo>
+                  <a:pt x="0" y="0"/>
+                </a:moveTo>
+                <a:lnTo>
+                  <a:pt x="120000" y="0"/>
+                </a:lnTo>
+                <a:lnTo>
+                  <a:pt x="120000" y="120000"/>
+                </a:lnTo>
+                <a:lnTo>
+                  <a:pt x="0" y="120000"/>
+                </a:lnTo>
+                <a:close/>
+              </a:path>
+            </a:pathLst>
+          </a:custGeom>
+        </p:spPr>
+      </p:sp>
+      <p:sp>
+        <p:nvSpPr>
+          <p:cNvPr id="228" name="Google Shape;228;g4ebcf7c756_0_8:notes"/>
           <p:cNvSpPr txBox="1"/>
           <p:nvPr>
             <p:ph idx="1" type="body"/>
@@ -10845,6 +10945,139 @@
         </p:nvSpPr>
         <p:spPr>
           <a:xfrm>
+            <a:off x="1297500" y="393750"/>
+            <a:ext cx="7038900" cy="914100"/>
+          </a:xfrm>
+          <a:prstGeom prst="rect">
+            <a:avLst/>
+          </a:prstGeom>
+        </p:spPr>
+        <p:txBody>
+          <a:bodyPr anchorCtr="0" anchor="t" bIns="91425" lIns="91425" spcFirstLastPara="1" rIns="91425" wrap="square" tIns="91425">
+            <a:noAutofit/>
+          </a:bodyPr>
+          <a:lstStyle/>
+          <a:p>
+            <a:pPr indent="0" lvl="0" marL="0" rtl="0" algn="l">
+              <a:spcBef>
+                <a:spcPts val="0"/>
+              </a:spcBef>
+              <a:spcAft>
+                <a:spcPts val="0"/>
+              </a:spcAft>
+              <a:buNone/>
+            </a:pPr>
+            <a:r>
+              <a:rPr lang="en"/>
+              <a:t>ER model</a:t>
+            </a:r>
+            <a:endParaRPr/>
+          </a:p>
+        </p:txBody>
+      </p:sp>
+      <p:sp>
+        <p:nvSpPr>
+          <p:cNvPr id="216" name="Google Shape;216;p25"/>
+          <p:cNvSpPr txBox="1"/>
+          <p:nvPr>
+            <p:ph idx="1" type="body"/>
+          </p:nvPr>
+        </p:nvSpPr>
+        <p:spPr>
+          <a:xfrm>
+            <a:off x="2631275" y="2533325"/>
+            <a:ext cx="2505300" cy="914100"/>
+          </a:xfrm>
+          <a:prstGeom prst="rect">
+            <a:avLst/>
+          </a:prstGeom>
+        </p:spPr>
+        <p:txBody>
+          <a:bodyPr anchorCtr="0" anchor="t" bIns="91425" lIns="91425" spcFirstLastPara="1" rIns="91425" wrap="square" tIns="91425">
+            <a:noAutofit/>
+          </a:bodyPr>
+          <a:lstStyle/>
+          <a:p>
+            <a:pPr indent="0" lvl="0" marL="0" rtl="0" algn="l">
+              <a:spcBef>
+                <a:spcPts val="0"/>
+              </a:spcBef>
+              <a:spcAft>
+                <a:spcPts val="1600"/>
+              </a:spcAft>
+              <a:buNone/>
+            </a:pPr>
+            <a:r>
+              <a:rPr lang="en"/>
+              <a:t>  </a:t>
+            </a:r>
+            <a:endParaRPr/>
+          </a:p>
+        </p:txBody>
+      </p:sp>
+      <p:pic>
+        <p:nvPicPr>
+          <p:cNvPr id="217" name="Google Shape;217;p25"/>
+          <p:cNvPicPr preferRelativeResize="0"/>
+          <p:nvPr/>
+        </p:nvPicPr>
+        <p:blipFill>
+          <a:blip r:embed="rId3">
+            <a:alphaModFix/>
+          </a:blip>
+          <a:stretch>
+            <a:fillRect/>
+          </a:stretch>
+        </p:blipFill>
+        <p:spPr>
+          <a:xfrm>
+            <a:off x="1297500" y="1307850"/>
+            <a:ext cx="4407634" cy="3587151"/>
+          </a:xfrm>
+          <a:prstGeom prst="rect">
+            <a:avLst/>
+          </a:prstGeom>
+          <a:noFill/>
+          <a:ln>
+            <a:noFill/>
+          </a:ln>
+        </p:spPr>
+      </p:pic>
+    </p:spTree>
+  </p:cSld>
+  <p:clrMapOvr>
+    <a:masterClrMapping/>
+  </p:clrMapOvr>
+</p:sld>
+</file>
+
+<file path=ppt/slides/slide14.xml><?xml version="1.0" encoding="utf-8"?>
+<p:sld xmlns:a="http://schemas.openxmlformats.org/drawingml/2006/main" xmlns:r="http://schemas.openxmlformats.org/officeDocument/2006/relationships" xmlns:mc="http://schemas.openxmlformats.org/markup-compatibility/2006" xmlns:mv="urn:schemas-microsoft-com:mac:vml" xmlns:p="http://schemas.openxmlformats.org/presentationml/2006/main" xmlns:c="http://schemas.openxmlformats.org/drawingml/2006/chart" xmlns:dgm="http://schemas.openxmlformats.org/drawingml/2006/diagram" xmlns:o="urn:schemas-microsoft-com:office:office" xmlns:v="urn:schemas-microsoft-com:vml" xmlns:pvml="urn:schemas-microsoft-com:office:powerpoint" xmlns:com="http://schemas.openxmlformats.org/drawingml/2006/compatibility" xmlns:p14="http://schemas.microsoft.com/office/powerpoint/2010/main" xmlns:p15="http://schemas.microsoft.com/office/powerpoint/2012/main">
+  <p:cSld>
+    <p:spTree>
+      <p:nvGrpSpPr>
+        <p:cNvPr id="221" name="Shape 221"/>
+        <p:cNvGrpSpPr/>
+        <p:nvPr/>
+      </p:nvGrpSpPr>
+      <p:grpSpPr>
+        <a:xfrm>
+          <a:off x="0" y="0"/>
+          <a:ext cx="0" cy="0"/>
+          <a:chOff x="0" y="0"/>
+          <a:chExt cx="0" cy="0"/>
+        </a:xfrm>
+      </p:grpSpPr>
+      <p:sp>
+        <p:nvSpPr>
+          <p:cNvPr id="222" name="Google Shape;222;p26"/>
+          <p:cNvSpPr txBox="1"/>
+          <p:nvPr>
+            <p:ph type="title"/>
+          </p:nvPr>
+        </p:nvSpPr>
+        <p:spPr>
+          <a:xfrm>
             <a:off x="829925" y="324525"/>
             <a:ext cx="7038900" cy="914100"/>
           </a:xfrm>
@@ -10877,7 +11110,7 @@
       </p:sp>
       <p:sp>
         <p:nvSpPr>
-          <p:cNvPr id="216" name="Google Shape;216;p25"/>
+          <p:cNvPr id="223" name="Google Shape;223;p26"/>
           <p:cNvSpPr txBox="1"/>
           <p:nvPr>
             <p:ph idx="1" type="body"/>
@@ -10917,7 +11150,7 @@
       </p:sp>
       <p:pic>
         <p:nvPicPr>
-          <p:cNvPr id="217" name="Google Shape;217;p25"/>
+          <p:cNvPr id="224" name="Google Shape;224;p26"/>
           <p:cNvPicPr preferRelativeResize="0"/>
           <p:nvPr/>
         </p:nvPicPr>
@@ -10945,7 +11178,7 @@
       </p:pic>
       <p:pic>
         <p:nvPicPr>
-          <p:cNvPr id="218" name="Google Shape;218;p25"/>
+          <p:cNvPr id="225" name="Google Shape;225;p26"/>
           <p:cNvPicPr preferRelativeResize="0"/>
           <p:nvPr/>
         </p:nvPicPr>
@@ -10979,12 +11212,12 @@
 </p:sld>
 </file>
 
-<file path=ppt/slides/slide14.xml><?xml version="1.0" encoding="utf-8"?>
+<file path=ppt/slides/slide15.xml><?xml version="1.0" encoding="utf-8"?>
 <p:sld xmlns:a="http://schemas.openxmlformats.org/drawingml/2006/main" xmlns:r="http://schemas.openxmlformats.org/officeDocument/2006/relationships" xmlns:mc="http://schemas.openxmlformats.org/markup-compatibility/2006" xmlns:mv="urn:schemas-microsoft-com:mac:vml" xmlns:p="http://schemas.openxmlformats.org/presentationml/2006/main" xmlns:c="http://schemas.openxmlformats.org/drawingml/2006/chart" xmlns:dgm="http://schemas.openxmlformats.org/drawingml/2006/diagram" xmlns:o="urn:schemas-microsoft-com:office:office" xmlns:v="urn:schemas-microsoft-com:vml" xmlns:pvml="urn:schemas-microsoft-com:office:powerpoint" xmlns:com="http://schemas.openxmlformats.org/drawingml/2006/compatibility" xmlns:p14="http://schemas.microsoft.com/office/powerpoint/2010/main" xmlns:p15="http://schemas.microsoft.com/office/powerpoint/2012/main">
   <p:cSld>
     <p:spTree>
       <p:nvGrpSpPr>
-        <p:cNvPr id="222" name="Shape 222"/>
+        <p:cNvPr id="229" name="Shape 229"/>
         <p:cNvGrpSpPr/>
         <p:nvPr/>
       </p:nvGrpSpPr>
@@ -10998,7 +11231,7 @@
       </p:grpSpPr>
       <p:sp>
         <p:nvSpPr>
-          <p:cNvPr id="223" name="Google Shape;223;p26"/>
+          <p:cNvPr id="230" name="Google Shape;230;p27"/>
           <p:cNvSpPr txBox="1"/>
           <p:nvPr>
             <p:ph type="title"/>
@@ -11038,7 +11271,7 @@
       </p:sp>
       <p:sp>
         <p:nvSpPr>
-          <p:cNvPr id="224" name="Google Shape;224;p26"/>
+          <p:cNvPr id="231" name="Google Shape;231;p27"/>
           <p:cNvSpPr txBox="1"/>
           <p:nvPr>
             <p:ph idx="1" type="body"/>
@@ -11078,7 +11311,7 @@
       </p:sp>
       <p:pic>
         <p:nvPicPr>
-          <p:cNvPr id="225" name="Google Shape;225;p26"/>
+          <p:cNvPr id="232" name="Google Shape;232;p27"/>
           <p:cNvPicPr preferRelativeResize="0"/>
           <p:nvPr/>
         </p:nvPicPr>
@@ -11106,7 +11339,7 @@
       </p:pic>
       <p:pic>
         <p:nvPicPr>
-          <p:cNvPr id="226" name="Google Shape;226;p26"/>
+          <p:cNvPr id="233" name="Google Shape;233;p27"/>
           <p:cNvPicPr preferRelativeResize="0"/>
           <p:nvPr/>
         </p:nvPicPr>

</xml_diff>

<commit_message>
Really last minute changes
</commit_message>
<xml_diff>
--- a/documentation/slides/PresentationFeb14.pptx
+++ b/documentation/slides/PresentationFeb14.pptx
@@ -803,7 +803,7 @@
   <p:cSld>
     <p:spTree>
       <p:nvGrpSpPr>
-        <p:cNvPr id="192" name="Shape 192"/>
+        <p:cNvPr id="191" name="Shape 191"/>
         <p:cNvGrpSpPr/>
         <p:nvPr/>
       </p:nvGrpSpPr>
@@ -817,7 +817,7 @@
       </p:grpSpPr>
       <p:sp>
         <p:nvSpPr>
-          <p:cNvPr id="193" name="Google Shape;193;g4ef95b29d4_0_0:notes"/>
+          <p:cNvPr id="192" name="Google Shape;192;g4f497c7c11_1_5:notes"/>
           <p:cNvSpPr/>
           <p:nvPr>
             <p:ph idx="2" type="sldImg"/>
@@ -852,7 +852,7 @@
       </p:sp>
       <p:sp>
         <p:nvSpPr>
-          <p:cNvPr id="194" name="Google Shape;194;g4ef95b29d4_0_0:notes"/>
+          <p:cNvPr id="193" name="Google Shape;193;g4f497c7c11_1_5:notes"/>
           <p:cNvSpPr txBox="1"/>
           <p:nvPr>
             <p:ph idx="1" type="body"/>
@@ -888,6 +888,22 @@
             </a:r>
             <a:endParaRPr/>
           </a:p>
+          <a:p>
+            <a:pPr indent="0" lvl="0" marL="0" rtl="0" algn="l">
+              <a:spcBef>
+                <a:spcPts val="0"/>
+              </a:spcBef>
+              <a:spcAft>
+                <a:spcPts val="0"/>
+              </a:spcAft>
+              <a:buNone/>
+            </a:pPr>
+            <a:r>
+              <a:rPr lang="en"/>
+              <a:t>Talk about controls in place.</a:t>
+            </a:r>
+            <a:endParaRPr/>
+          </a:p>
         </p:txBody>
       </p:sp>
     </p:spTree>
@@ -903,7 +919,7 @@
   <p:cSld>
     <p:spTree>
       <p:nvGrpSpPr>
-        <p:cNvPr id="198" name="Shape 198"/>
+        <p:cNvPr id="199" name="Shape 199"/>
         <p:cNvGrpSpPr/>
         <p:nvPr/>
       </p:nvGrpSpPr>
@@ -917,7 +933,7 @@
       </p:grpSpPr>
       <p:sp>
         <p:nvSpPr>
-          <p:cNvPr id="199" name="Google Shape;199;g4ef95b29d4_0_5:notes"/>
+          <p:cNvPr id="200" name="Google Shape;200;g4ef95b29d4_0_0:notes"/>
           <p:cNvSpPr/>
           <p:nvPr>
             <p:ph idx="2" type="sldImg"/>
@@ -952,7 +968,7 @@
       </p:sp>
       <p:sp>
         <p:nvSpPr>
-          <p:cNvPr id="200" name="Google Shape;200;g4ef95b29d4_0_5:notes"/>
+          <p:cNvPr id="201" name="Google Shape;201;g4ef95b29d4_0_0:notes"/>
           <p:cNvSpPr txBox="1"/>
           <p:nvPr>
             <p:ph idx="1" type="body"/>
@@ -984,7 +1000,7 @@
             </a:pPr>
             <a:r>
               <a:rPr lang="en"/>
-              <a:t>JOSH: need to explain how we’re designing our MassMine integration.</a:t>
+              <a:t>JOSH</a:t>
             </a:r>
             <a:endParaRPr/>
           </a:p>
@@ -1017,7 +1033,7 @@
       </p:grpSpPr>
       <p:sp>
         <p:nvSpPr>
-          <p:cNvPr id="206" name="Google Shape;206;g4ef95b29d4_0_12:notes"/>
+          <p:cNvPr id="206" name="Google Shape;206;g4ef95b29d4_0_5:notes"/>
           <p:cNvSpPr/>
           <p:nvPr>
             <p:ph idx="2" type="sldImg"/>
@@ -1052,7 +1068,7 @@
       </p:sp>
       <p:sp>
         <p:nvSpPr>
-          <p:cNvPr id="207" name="Google Shape;207;g4ef95b29d4_0_12:notes"/>
+          <p:cNvPr id="207" name="Google Shape;207;g4ef95b29d4_0_5:notes"/>
           <p:cNvSpPr txBox="1"/>
           <p:nvPr>
             <p:ph idx="1" type="body"/>
@@ -1084,7 +1100,7 @@
             </a:pPr>
             <a:r>
               <a:rPr lang="en"/>
-              <a:t>LOGAN</a:t>
+              <a:t>JOSH: need to explain how we’re designing our MassMine integration.</a:t>
             </a:r>
             <a:endParaRPr/>
           </a:p>
@@ -1103,7 +1119,7 @@
   <p:cSld>
     <p:spTree>
       <p:nvGrpSpPr>
-        <p:cNvPr id="211" name="Shape 211"/>
+        <p:cNvPr id="212" name="Shape 212"/>
         <p:cNvGrpSpPr/>
         <p:nvPr/>
       </p:nvGrpSpPr>
@@ -1117,7 +1133,7 @@
       </p:grpSpPr>
       <p:sp>
         <p:nvSpPr>
-          <p:cNvPr id="212" name="Google Shape;212;g4ef95b29d4_0_29:notes"/>
+          <p:cNvPr id="213" name="Google Shape;213;g4ef95b29d4_0_12:notes"/>
           <p:cNvSpPr/>
           <p:nvPr>
             <p:ph idx="2" type="sldImg"/>
@@ -1152,7 +1168,7 @@
       </p:sp>
       <p:sp>
         <p:nvSpPr>
-          <p:cNvPr id="213" name="Google Shape;213;g4ef95b29d4_0_29:notes"/>
+          <p:cNvPr id="214" name="Google Shape;214;g4ef95b29d4_0_12:notes"/>
           <p:cNvSpPr txBox="1"/>
           <p:nvPr>
             <p:ph idx="1" type="body"/>
@@ -1184,7 +1200,7 @@
             </a:pPr>
             <a:r>
               <a:rPr lang="en"/>
-              <a:t>Logan</a:t>
+              <a:t>LOGAN</a:t>
             </a:r>
             <a:endParaRPr/>
           </a:p>
@@ -1203,7 +1219,7 @@
   <p:cSld>
     <p:spTree>
       <p:nvGrpSpPr>
-        <p:cNvPr id="219" name="Shape 219"/>
+        <p:cNvPr id="218" name="Shape 218"/>
         <p:cNvGrpSpPr/>
         <p:nvPr/>
       </p:nvGrpSpPr>
@@ -1217,7 +1233,7 @@
       </p:grpSpPr>
       <p:sp>
         <p:nvSpPr>
-          <p:cNvPr id="220" name="Google Shape;220;g4f10e51428_0_0:notes"/>
+          <p:cNvPr id="219" name="Google Shape;219;g4ef95b29d4_0_29:notes"/>
           <p:cNvSpPr/>
           <p:nvPr>
             <p:ph idx="2" type="sldImg"/>
@@ -1252,7 +1268,7 @@
       </p:sp>
       <p:sp>
         <p:nvSpPr>
-          <p:cNvPr id="221" name="Google Shape;221;g4f10e51428_0_0:notes"/>
+          <p:cNvPr id="220" name="Google Shape;220;g4ef95b29d4_0_29:notes"/>
           <p:cNvSpPr txBox="1"/>
           <p:nvPr>
             <p:ph idx="1" type="body"/>
@@ -1617,7 +1633,7 @@
       </p:grpSpPr>
       <p:sp>
         <p:nvSpPr>
-          <p:cNvPr id="143" name="Google Shape;143;g4ecbea148f_0_5:notes"/>
+          <p:cNvPr id="143" name="Google Shape;143;g4f10e51428_0_0:notes"/>
           <p:cNvSpPr/>
           <p:nvPr>
             <p:ph idx="2" type="sldImg"/>
@@ -1652,7 +1668,7 @@
       </p:sp>
       <p:sp>
         <p:nvSpPr>
-          <p:cNvPr id="144" name="Google Shape;144;g4ecbea148f_0_5:notes"/>
+          <p:cNvPr id="144" name="Google Shape;144;g4f10e51428_0_0:notes"/>
           <p:cNvSpPr txBox="1"/>
           <p:nvPr>
             <p:ph idx="1" type="body"/>
@@ -1684,7 +1700,7 @@
             </a:pPr>
             <a:r>
               <a:rPr lang="en"/>
-              <a:t>Patti? Going over 4.1 essentially.</a:t>
+              <a:t>Logan</a:t>
             </a:r>
             <a:endParaRPr/>
           </a:p>
@@ -1703,7 +1719,7 @@
   <p:cSld>
     <p:spTree>
       <p:nvGrpSpPr>
-        <p:cNvPr id="150" name="Shape 150"/>
+        <p:cNvPr id="149" name="Shape 149"/>
         <p:cNvGrpSpPr/>
         <p:nvPr/>
       </p:nvGrpSpPr>
@@ -1717,7 +1733,7 @@
       </p:grpSpPr>
       <p:sp>
         <p:nvSpPr>
-          <p:cNvPr id="151" name="Google Shape;151;g4f8ee017a1_0_1:notes"/>
+          <p:cNvPr id="150" name="Google Shape;150;g4ecbea148f_0_5:notes"/>
           <p:cNvSpPr/>
           <p:nvPr>
             <p:ph idx="2" type="sldImg"/>
@@ -1752,7 +1768,7 @@
       </p:sp>
       <p:sp>
         <p:nvSpPr>
-          <p:cNvPr id="152" name="Google Shape;152;g4f8ee017a1_0_1:notes"/>
+          <p:cNvPr id="151" name="Google Shape;151;g4ecbea148f_0_5:notes"/>
           <p:cNvSpPr txBox="1"/>
           <p:nvPr>
             <p:ph idx="1" type="body"/>
@@ -1784,7 +1800,7 @@
             </a:pPr>
             <a:r>
               <a:rPr lang="en"/>
-              <a:t>Patti</a:t>
+              <a:t>Patti? Going over 4.1 essentially.</a:t>
             </a:r>
             <a:endParaRPr/>
           </a:p>
@@ -1803,7 +1819,7 @@
   <p:cSld>
     <p:spTree>
       <p:nvGrpSpPr>
-        <p:cNvPr id="156" name="Shape 156"/>
+        <p:cNvPr id="157" name="Shape 157"/>
         <p:cNvGrpSpPr/>
         <p:nvPr/>
       </p:nvGrpSpPr>
@@ -1817,7 +1833,7 @@
       </p:grpSpPr>
       <p:sp>
         <p:nvSpPr>
-          <p:cNvPr id="157" name="Google Shape;157;g4ef95b29d4_0_42:notes"/>
+          <p:cNvPr id="158" name="Google Shape;158;g4f8ee017a1_0_1:notes"/>
           <p:cNvSpPr/>
           <p:nvPr>
             <p:ph idx="2" type="sldImg"/>
@@ -1852,7 +1868,7 @@
       </p:sp>
       <p:sp>
         <p:nvSpPr>
-          <p:cNvPr id="158" name="Google Shape;158;g4ef95b29d4_0_42:notes"/>
+          <p:cNvPr id="159" name="Google Shape;159;g4f8ee017a1_0_1:notes"/>
           <p:cNvSpPr txBox="1"/>
           <p:nvPr>
             <p:ph idx="1" type="body"/>
@@ -1884,23 +1900,7 @@
             </a:pPr>
             <a:r>
               <a:rPr lang="en"/>
-              <a:t>MORGAN</a:t>
-            </a:r>
-            <a:endParaRPr/>
-          </a:p>
-          <a:p>
-            <a:pPr indent="0" lvl="0" marL="0" rtl="0" algn="l">
-              <a:spcBef>
-                <a:spcPts val="0"/>
-              </a:spcBef>
-              <a:spcAft>
-                <a:spcPts val="0"/>
-              </a:spcAft>
-              <a:buNone/>
-            </a:pPr>
-            <a:r>
-              <a:rPr lang="en"/>
-              <a:t>Talk about controls and I/O</a:t>
+              <a:t>Patti</a:t>
             </a:r>
             <a:endParaRPr/>
           </a:p>
@@ -1933,7 +1933,7 @@
       </p:grpSpPr>
       <p:sp>
         <p:nvSpPr>
-          <p:cNvPr id="164" name="Google Shape;164;g4f497c7c11_1_0:notes"/>
+          <p:cNvPr id="164" name="Google Shape;164;g4ef95b29d4_0_42:notes"/>
           <p:cNvSpPr/>
           <p:nvPr>
             <p:ph idx="2" type="sldImg"/>
@@ -1968,7 +1968,7 @@
       </p:sp>
       <p:sp>
         <p:nvSpPr>
-          <p:cNvPr id="165" name="Google Shape;165;g4f497c7c11_1_0:notes"/>
+          <p:cNvPr id="165" name="Google Shape;165;g4ef95b29d4_0_42:notes"/>
           <p:cNvSpPr txBox="1"/>
           <p:nvPr>
             <p:ph idx="1" type="body"/>
@@ -2016,7 +2016,7 @@
             </a:pPr>
             <a:r>
               <a:rPr lang="en"/>
-              <a:t>What analyses? Try to list all from memory.</a:t>
+              <a:t>Talk about controls and I/O</a:t>
             </a:r>
             <a:endParaRPr/>
           </a:p>
@@ -2049,7 +2049,7 @@
       </p:grpSpPr>
       <p:sp>
         <p:nvSpPr>
-          <p:cNvPr id="171" name="Google Shape;171;g4ecbea148f_1_0:notes"/>
+          <p:cNvPr id="171" name="Google Shape;171;g4f497c7c11_1_0:notes"/>
           <p:cNvSpPr/>
           <p:nvPr>
             <p:ph idx="2" type="sldImg"/>
@@ -2084,7 +2084,7 @@
       </p:sp>
       <p:sp>
         <p:nvSpPr>
-          <p:cNvPr id="172" name="Google Shape;172;g4ecbea148f_1_0:notes"/>
+          <p:cNvPr id="172" name="Google Shape;172;g4f497c7c11_1_0:notes"/>
           <p:cNvSpPr txBox="1"/>
           <p:nvPr>
             <p:ph idx="1" type="body"/>
@@ -2120,6 +2120,22 @@
             </a:r>
             <a:endParaRPr/>
           </a:p>
+          <a:p>
+            <a:pPr indent="0" lvl="0" marL="0" rtl="0" algn="l">
+              <a:spcBef>
+                <a:spcPts val="0"/>
+              </a:spcBef>
+              <a:spcAft>
+                <a:spcPts val="0"/>
+              </a:spcAft>
+              <a:buNone/>
+            </a:pPr>
+            <a:r>
+              <a:rPr lang="en"/>
+              <a:t>What analyses? Try to list all from memory.</a:t>
+            </a:r>
+            <a:endParaRPr/>
+          </a:p>
         </p:txBody>
       </p:sp>
     </p:spTree>
@@ -2135,7 +2151,7 @@
   <p:cSld>
     <p:spTree>
       <p:nvGrpSpPr>
-        <p:cNvPr id="176" name="Shape 176"/>
+        <p:cNvPr id="177" name="Shape 177"/>
         <p:cNvGrpSpPr/>
         <p:nvPr/>
       </p:nvGrpSpPr>
@@ -2149,7 +2165,7 @@
       </p:grpSpPr>
       <p:sp>
         <p:nvSpPr>
-          <p:cNvPr id="177" name="Google Shape;177;g4f10e51428_1_0:notes"/>
+          <p:cNvPr id="178" name="Google Shape;178;g4ecbea148f_1_0:notes"/>
           <p:cNvSpPr/>
           <p:nvPr>
             <p:ph idx="2" type="sldImg"/>
@@ -2184,7 +2200,7 @@
       </p:sp>
       <p:sp>
         <p:nvSpPr>
-          <p:cNvPr id="178" name="Google Shape;178;g4f10e51428_1_0:notes"/>
+          <p:cNvPr id="179" name="Google Shape;179;g4ecbea148f_1_0:notes"/>
           <p:cNvSpPr txBox="1"/>
           <p:nvPr>
             <p:ph idx="1" type="body"/>
@@ -2215,7 +2231,8 @@
               <a:buNone/>
             </a:pPr>
             <a:r>
-              <a:t/>
+              <a:rPr lang="en"/>
+              <a:t>MORGAN</a:t>
             </a:r>
             <a:endParaRPr/>
           </a:p>
@@ -2234,7 +2251,7 @@
   <p:cSld>
     <p:spTree>
       <p:nvGrpSpPr>
-        <p:cNvPr id="184" name="Shape 184"/>
+        <p:cNvPr id="183" name="Shape 183"/>
         <p:cNvGrpSpPr/>
         <p:nvPr/>
       </p:nvGrpSpPr>
@@ -2248,7 +2265,7 @@
       </p:grpSpPr>
       <p:sp>
         <p:nvSpPr>
-          <p:cNvPr id="185" name="Google Shape;185;g4f497c7c11_1_5:notes"/>
+          <p:cNvPr id="184" name="Google Shape;184;g4f10e51428_1_0:notes"/>
           <p:cNvSpPr/>
           <p:nvPr>
             <p:ph idx="2" type="sldImg"/>
@@ -2283,7 +2300,7 @@
       </p:sp>
       <p:sp>
         <p:nvSpPr>
-          <p:cNvPr id="186" name="Google Shape;186;g4f497c7c11_1_5:notes"/>
+          <p:cNvPr id="185" name="Google Shape;185;g4f10e51428_1_0:notes"/>
           <p:cNvSpPr txBox="1"/>
           <p:nvPr>
             <p:ph idx="1" type="body"/>
@@ -2314,24 +2331,7 @@
               <a:buNone/>
             </a:pPr>
             <a:r>
-              <a:rPr lang="en"/>
-              <a:t>JOSH</a:t>
-            </a:r>
-            <a:endParaRPr/>
-          </a:p>
-          <a:p>
-            <a:pPr indent="0" lvl="0" marL="0" rtl="0" algn="l">
-              <a:spcBef>
-                <a:spcPts val="0"/>
-              </a:spcBef>
-              <a:spcAft>
-                <a:spcPts val="0"/>
-              </a:spcAft>
-              <a:buNone/>
-            </a:pPr>
-            <a:r>
-              <a:rPr lang="en"/>
-              <a:t>Talk about controls in place.</a:t>
+              <a:t/>
             </a:r>
             <a:endParaRPr/>
           </a:p>
@@ -10611,7 +10611,7 @@
   <p:cSld>
     <p:spTree>
       <p:nvGrpSpPr>
-        <p:cNvPr id="195" name="Shape 195"/>
+        <p:cNvPr id="194" name="Shape 194"/>
         <p:cNvGrpSpPr/>
         <p:nvPr/>
       </p:nvGrpSpPr>
@@ -10625,7 +10625,7 @@
       </p:grpSpPr>
       <p:sp>
         <p:nvSpPr>
-          <p:cNvPr id="196" name="Google Shape;196;p22"/>
+          <p:cNvPr id="195" name="Google Shape;195;p22"/>
           <p:cNvSpPr txBox="1"/>
           <p:nvPr>
             <p:ph type="title"/>
@@ -10653,6 +10653,196 @@
               <a:spcAft>
                 <a:spcPts val="0"/>
               </a:spcAft>
+              <a:buNone/>
+            </a:pPr>
+            <a:r>
+              <a:rPr lang="en"/>
+              <a:t>Web GUI Design</a:t>
+            </a:r>
+            <a:endParaRPr/>
+          </a:p>
+        </p:txBody>
+      </p:sp>
+      <p:sp>
+        <p:nvSpPr>
+          <p:cNvPr id="196" name="Google Shape;196;p22"/>
+          <p:cNvSpPr txBox="1"/>
+          <p:nvPr>
+            <p:ph idx="1" type="body"/>
+          </p:nvPr>
+        </p:nvSpPr>
+        <p:spPr>
+          <a:xfrm>
+            <a:off x="1297500" y="1567550"/>
+            <a:ext cx="2400300" cy="1126800"/>
+          </a:xfrm>
+          <a:prstGeom prst="rect">
+            <a:avLst/>
+          </a:prstGeom>
+        </p:spPr>
+        <p:txBody>
+          <a:bodyPr anchorCtr="0" anchor="t" bIns="91425" lIns="91425" spcFirstLastPara="1" rIns="91425" wrap="square" tIns="91425">
+            <a:noAutofit/>
+          </a:bodyPr>
+          <a:lstStyle/>
+          <a:p>
+            <a:pPr indent="0" lvl="0" marL="0" rtl="0" algn="l">
+              <a:spcBef>
+                <a:spcPts val="0"/>
+              </a:spcBef>
+              <a:spcAft>
+                <a:spcPts val="1600"/>
+              </a:spcAft>
+              <a:buNone/>
+            </a:pPr>
+            <a:r>
+              <a:t/>
+            </a:r>
+            <a:endParaRPr/>
+          </a:p>
+        </p:txBody>
+      </p:sp>
+      <p:pic>
+        <p:nvPicPr>
+          <p:cNvPr id="197" name="Google Shape;197;p22"/>
+          <p:cNvPicPr preferRelativeResize="0"/>
+          <p:nvPr/>
+        </p:nvPicPr>
+        <p:blipFill>
+          <a:blip r:embed="rId3">
+            <a:alphaModFix/>
+          </a:blip>
+          <a:stretch>
+            <a:fillRect/>
+          </a:stretch>
+        </p:blipFill>
+        <p:spPr>
+          <a:xfrm>
+            <a:off x="897275" y="1254538"/>
+            <a:ext cx="5943600" cy="2085975"/>
+          </a:xfrm>
+          <a:prstGeom prst="rect">
+            <a:avLst/>
+          </a:prstGeom>
+          <a:noFill/>
+          <a:ln>
+            <a:noFill/>
+          </a:ln>
+        </p:spPr>
+      </p:pic>
+      <p:sp>
+        <p:nvSpPr>
+          <p:cNvPr id="198" name="Google Shape;198;p22"/>
+          <p:cNvSpPr txBox="1"/>
+          <p:nvPr/>
+        </p:nvSpPr>
+        <p:spPr>
+          <a:xfrm>
+            <a:off x="956075" y="3461125"/>
+            <a:ext cx="7226100" cy="1289700"/>
+          </a:xfrm>
+          <a:prstGeom prst="rect">
+            <a:avLst/>
+          </a:prstGeom>
+          <a:noFill/>
+          <a:ln>
+            <a:noFill/>
+          </a:ln>
+        </p:spPr>
+        <p:txBody>
+          <a:bodyPr anchorCtr="0" anchor="t" bIns="91425" lIns="91425" spcFirstLastPara="1" rIns="91425" wrap="square" tIns="91425">
+            <a:noAutofit/>
+          </a:bodyPr>
+          <a:lstStyle/>
+          <a:p>
+            <a:pPr indent="0" lvl="0" marL="0" rtl="0" algn="l">
+              <a:spcBef>
+                <a:spcPts val="0"/>
+              </a:spcBef>
+              <a:spcAft>
+                <a:spcPts val="0"/>
+              </a:spcAft>
+              <a:buNone/>
+            </a:pPr>
+            <a:r>
+              <a:rPr lang="en">
+                <a:solidFill>
+                  <a:srgbClr val="FFFFFF"/>
+                </a:solidFill>
+                <a:latin typeface="Lato"/>
+                <a:ea typeface="Lato"/>
+                <a:cs typeface="Lato"/>
+                <a:sym typeface="Lato"/>
+              </a:rPr>
+              <a:t>Additional pages are the user management page, the query page, and the analysis page.</a:t>
+            </a:r>
+            <a:endParaRPr>
+              <a:solidFill>
+                <a:srgbClr val="FFFFFF"/>
+              </a:solidFill>
+              <a:latin typeface="Lato"/>
+              <a:ea typeface="Lato"/>
+              <a:cs typeface="Lato"/>
+              <a:sym typeface="Lato"/>
+            </a:endParaRPr>
+          </a:p>
+        </p:txBody>
+      </p:sp>
+    </p:spTree>
+  </p:cSld>
+  <p:clrMapOvr>
+    <a:masterClrMapping/>
+  </p:clrMapOvr>
+</p:sld>
+</file>
+
+<file path=ppt/slides/slide11.xml><?xml version="1.0" encoding="utf-8"?>
+<p:sld xmlns:a="http://schemas.openxmlformats.org/drawingml/2006/main" xmlns:r="http://schemas.openxmlformats.org/officeDocument/2006/relationships" xmlns:mc="http://schemas.openxmlformats.org/markup-compatibility/2006" xmlns:mv="urn:schemas-microsoft-com:mac:vml" xmlns:p="http://schemas.openxmlformats.org/presentationml/2006/main" xmlns:c="http://schemas.openxmlformats.org/drawingml/2006/chart" xmlns:dgm="http://schemas.openxmlformats.org/drawingml/2006/diagram" xmlns:o="urn:schemas-microsoft-com:office:office" xmlns:v="urn:schemas-microsoft-com:vml" xmlns:pvml="urn:schemas-microsoft-com:office:powerpoint" xmlns:com="http://schemas.openxmlformats.org/drawingml/2006/compatibility" xmlns:p14="http://schemas.microsoft.com/office/powerpoint/2010/main" xmlns:p15="http://schemas.microsoft.com/office/powerpoint/2012/main">
+  <p:cSld>
+    <p:spTree>
+      <p:nvGrpSpPr>
+        <p:cNvPr id="202" name="Shape 202"/>
+        <p:cNvGrpSpPr/>
+        <p:nvPr/>
+      </p:nvGrpSpPr>
+      <p:grpSpPr>
+        <a:xfrm>
+          <a:off x="0" y="0"/>
+          <a:ext cx="0" cy="0"/>
+          <a:chOff x="0" y="0"/>
+          <a:chExt cx="0" cy="0"/>
+        </a:xfrm>
+      </p:grpSpPr>
+      <p:sp>
+        <p:nvSpPr>
+          <p:cNvPr id="203" name="Google Shape;203;p23"/>
+          <p:cNvSpPr txBox="1"/>
+          <p:nvPr>
+            <p:ph type="title"/>
+          </p:nvPr>
+        </p:nvSpPr>
+        <p:spPr>
+          <a:xfrm>
+            <a:off x="1297500" y="393750"/>
+            <a:ext cx="7038900" cy="914100"/>
+          </a:xfrm>
+          <a:prstGeom prst="rect">
+            <a:avLst/>
+          </a:prstGeom>
+        </p:spPr>
+        <p:txBody>
+          <a:bodyPr anchorCtr="0" anchor="t" bIns="91425" lIns="91425" spcFirstLastPara="1" rIns="91425" wrap="square" tIns="91425">
+            <a:noAutofit/>
+          </a:bodyPr>
+          <a:lstStyle/>
+          <a:p>
+            <a:pPr indent="0" lvl="0" marL="0" rtl="0" algn="l">
+              <a:spcBef>
+                <a:spcPts val="0"/>
+              </a:spcBef>
+              <a:spcAft>
+                <a:spcPts val="0"/>
+              </a:spcAft>
               <a:buClr>
                 <a:srgbClr val="000000"/>
               </a:buClr>
@@ -10670,7 +10860,7 @@
       </p:sp>
       <p:sp>
         <p:nvSpPr>
-          <p:cNvPr id="197" name="Google Shape;197;p22"/>
+          <p:cNvPr id="204" name="Google Shape;204;p23"/>
           <p:cNvSpPr txBox="1"/>
           <p:nvPr>
             <p:ph idx="1" type="body"/>
@@ -10751,139 +10941,6 @@
           </a:p>
         </p:txBody>
       </p:sp>
-    </p:spTree>
-  </p:cSld>
-  <p:clrMapOvr>
-    <a:masterClrMapping/>
-  </p:clrMapOvr>
-</p:sld>
-</file>
-
-<file path=ppt/slides/slide11.xml><?xml version="1.0" encoding="utf-8"?>
-<p:sld xmlns:a="http://schemas.openxmlformats.org/drawingml/2006/main" xmlns:r="http://schemas.openxmlformats.org/officeDocument/2006/relationships" xmlns:mc="http://schemas.openxmlformats.org/markup-compatibility/2006" xmlns:mv="urn:schemas-microsoft-com:mac:vml" xmlns:p="http://schemas.openxmlformats.org/presentationml/2006/main" xmlns:c="http://schemas.openxmlformats.org/drawingml/2006/chart" xmlns:dgm="http://schemas.openxmlformats.org/drawingml/2006/diagram" xmlns:o="urn:schemas-microsoft-com:office:office" xmlns:v="urn:schemas-microsoft-com:vml" xmlns:pvml="urn:schemas-microsoft-com:office:powerpoint" xmlns:com="http://schemas.openxmlformats.org/drawingml/2006/compatibility" xmlns:p14="http://schemas.microsoft.com/office/powerpoint/2010/main" xmlns:p15="http://schemas.microsoft.com/office/powerpoint/2012/main">
-  <p:cSld>
-    <p:spTree>
-      <p:nvGrpSpPr>
-        <p:cNvPr id="201" name="Shape 201"/>
-        <p:cNvGrpSpPr/>
-        <p:nvPr/>
-      </p:nvGrpSpPr>
-      <p:grpSpPr>
-        <a:xfrm>
-          <a:off x="0" y="0"/>
-          <a:ext cx="0" cy="0"/>
-          <a:chOff x="0" y="0"/>
-          <a:chExt cx="0" cy="0"/>
-        </a:xfrm>
-      </p:grpSpPr>
-      <p:sp>
-        <p:nvSpPr>
-          <p:cNvPr id="202" name="Google Shape;202;p23"/>
-          <p:cNvSpPr txBox="1"/>
-          <p:nvPr>
-            <p:ph type="title"/>
-          </p:nvPr>
-        </p:nvSpPr>
-        <p:spPr>
-          <a:xfrm>
-            <a:off x="1297500" y="393750"/>
-            <a:ext cx="7038900" cy="914100"/>
-          </a:xfrm>
-          <a:prstGeom prst="rect">
-            <a:avLst/>
-          </a:prstGeom>
-        </p:spPr>
-        <p:txBody>
-          <a:bodyPr anchorCtr="0" anchor="t" bIns="91425" lIns="91425" spcFirstLastPara="1" rIns="91425" wrap="square" tIns="91425">
-            <a:noAutofit/>
-          </a:bodyPr>
-          <a:lstStyle/>
-          <a:p>
-            <a:pPr indent="0" lvl="0" marL="0" rtl="0" algn="l">
-              <a:spcBef>
-                <a:spcPts val="0"/>
-              </a:spcBef>
-              <a:spcAft>
-                <a:spcPts val="0"/>
-              </a:spcAft>
-              <a:buNone/>
-            </a:pPr>
-            <a:r>
-              <a:rPr lang="en"/>
-              <a:t>MassMine Integration Design</a:t>
-            </a:r>
-            <a:endParaRPr/>
-          </a:p>
-        </p:txBody>
-      </p:sp>
-      <p:sp>
-        <p:nvSpPr>
-          <p:cNvPr id="203" name="Google Shape;203;p23"/>
-          <p:cNvSpPr txBox="1"/>
-          <p:nvPr>
-            <p:ph idx="1" type="body"/>
-          </p:nvPr>
-        </p:nvSpPr>
-        <p:spPr>
-          <a:xfrm>
-            <a:off x="236925" y="1307850"/>
-            <a:ext cx="1912800" cy="2911200"/>
-          </a:xfrm>
-          <a:prstGeom prst="rect">
-            <a:avLst/>
-          </a:prstGeom>
-        </p:spPr>
-        <p:txBody>
-          <a:bodyPr anchorCtr="0" anchor="t" bIns="91425" lIns="91425" spcFirstLastPara="1" rIns="91425" wrap="square" tIns="91425">
-            <a:noAutofit/>
-          </a:bodyPr>
-          <a:lstStyle/>
-          <a:p>
-            <a:pPr indent="0" lvl="0" marL="0" rtl="0" algn="l">
-              <a:spcBef>
-                <a:spcPts val="0"/>
-              </a:spcBef>
-              <a:spcAft>
-                <a:spcPts val="1600"/>
-              </a:spcAft>
-              <a:buNone/>
-            </a:pPr>
-            <a:r>
-              <a:rPr lang="en"/>
-              <a:t>   </a:t>
-            </a:r>
-            <a:endParaRPr/>
-          </a:p>
-        </p:txBody>
-      </p:sp>
-      <p:pic>
-        <p:nvPicPr>
-          <p:cNvPr id="204" name="Google Shape;204;p23"/>
-          <p:cNvPicPr preferRelativeResize="0"/>
-          <p:nvPr/>
-        </p:nvPicPr>
-        <p:blipFill>
-          <a:blip r:embed="rId3">
-            <a:alphaModFix/>
-          </a:blip>
-          <a:stretch>
-            <a:fillRect/>
-          </a:stretch>
-        </p:blipFill>
-        <p:spPr>
-          <a:xfrm>
-            <a:off x="552850" y="1098725"/>
-            <a:ext cx="8038300" cy="3717700"/>
-          </a:xfrm>
-          <a:prstGeom prst="rect">
-            <a:avLst/>
-          </a:prstGeom>
-          <a:noFill/>
-          <a:ln>
-            <a:noFill/>
-          </a:ln>
-        </p:spPr>
-      </p:pic>
     </p:spTree>
   </p:cSld>
   <p:clrMapOvr>
@@ -10943,6 +11000,139 @@
             </a:pPr>
             <a:r>
               <a:rPr lang="en"/>
+              <a:t>MassMine Integration Design</a:t>
+            </a:r>
+            <a:endParaRPr/>
+          </a:p>
+        </p:txBody>
+      </p:sp>
+      <p:sp>
+        <p:nvSpPr>
+          <p:cNvPr id="210" name="Google Shape;210;p24"/>
+          <p:cNvSpPr txBox="1"/>
+          <p:nvPr>
+            <p:ph idx="1" type="body"/>
+          </p:nvPr>
+        </p:nvSpPr>
+        <p:spPr>
+          <a:xfrm>
+            <a:off x="236925" y="1307850"/>
+            <a:ext cx="1912800" cy="2911200"/>
+          </a:xfrm>
+          <a:prstGeom prst="rect">
+            <a:avLst/>
+          </a:prstGeom>
+        </p:spPr>
+        <p:txBody>
+          <a:bodyPr anchorCtr="0" anchor="t" bIns="91425" lIns="91425" spcFirstLastPara="1" rIns="91425" wrap="square" tIns="91425">
+            <a:noAutofit/>
+          </a:bodyPr>
+          <a:lstStyle/>
+          <a:p>
+            <a:pPr indent="0" lvl="0" marL="0" rtl="0" algn="l">
+              <a:spcBef>
+                <a:spcPts val="0"/>
+              </a:spcBef>
+              <a:spcAft>
+                <a:spcPts val="1600"/>
+              </a:spcAft>
+              <a:buNone/>
+            </a:pPr>
+            <a:r>
+              <a:rPr lang="en"/>
+              <a:t>   </a:t>
+            </a:r>
+            <a:endParaRPr/>
+          </a:p>
+        </p:txBody>
+      </p:sp>
+      <p:pic>
+        <p:nvPicPr>
+          <p:cNvPr id="211" name="Google Shape;211;p24"/>
+          <p:cNvPicPr preferRelativeResize="0"/>
+          <p:nvPr/>
+        </p:nvPicPr>
+        <p:blipFill>
+          <a:blip r:embed="rId3">
+            <a:alphaModFix/>
+          </a:blip>
+          <a:stretch>
+            <a:fillRect/>
+          </a:stretch>
+        </p:blipFill>
+        <p:spPr>
+          <a:xfrm>
+            <a:off x="552850" y="1098725"/>
+            <a:ext cx="8038300" cy="3717700"/>
+          </a:xfrm>
+          <a:prstGeom prst="rect">
+            <a:avLst/>
+          </a:prstGeom>
+          <a:noFill/>
+          <a:ln>
+            <a:noFill/>
+          </a:ln>
+        </p:spPr>
+      </p:pic>
+    </p:spTree>
+  </p:cSld>
+  <p:clrMapOvr>
+    <a:masterClrMapping/>
+  </p:clrMapOvr>
+</p:sld>
+</file>
+
+<file path=ppt/slides/slide13.xml><?xml version="1.0" encoding="utf-8"?>
+<p:sld xmlns:a="http://schemas.openxmlformats.org/drawingml/2006/main" xmlns:r="http://schemas.openxmlformats.org/officeDocument/2006/relationships" xmlns:mc="http://schemas.openxmlformats.org/markup-compatibility/2006" xmlns:mv="urn:schemas-microsoft-com:mac:vml" xmlns:p="http://schemas.openxmlformats.org/presentationml/2006/main" xmlns:c="http://schemas.openxmlformats.org/drawingml/2006/chart" xmlns:dgm="http://schemas.openxmlformats.org/drawingml/2006/diagram" xmlns:o="urn:schemas-microsoft-com:office:office" xmlns:v="urn:schemas-microsoft-com:vml" xmlns:pvml="urn:schemas-microsoft-com:office:powerpoint" xmlns:com="http://schemas.openxmlformats.org/drawingml/2006/compatibility" xmlns:p14="http://schemas.microsoft.com/office/powerpoint/2010/main" xmlns:p15="http://schemas.microsoft.com/office/powerpoint/2012/main">
+  <p:cSld>
+    <p:spTree>
+      <p:nvGrpSpPr>
+        <p:cNvPr id="215" name="Shape 215"/>
+        <p:cNvGrpSpPr/>
+        <p:nvPr/>
+      </p:nvGrpSpPr>
+      <p:grpSpPr>
+        <a:xfrm>
+          <a:off x="0" y="0"/>
+          <a:ext cx="0" cy="0"/>
+          <a:chOff x="0" y="0"/>
+          <a:chExt cx="0" cy="0"/>
+        </a:xfrm>
+      </p:grpSpPr>
+      <p:sp>
+        <p:nvSpPr>
+          <p:cNvPr id="216" name="Google Shape;216;p25"/>
+          <p:cNvSpPr txBox="1"/>
+          <p:nvPr>
+            <p:ph type="title"/>
+          </p:nvPr>
+        </p:nvSpPr>
+        <p:spPr>
+          <a:xfrm>
+            <a:off x="1297500" y="393750"/>
+            <a:ext cx="7038900" cy="914100"/>
+          </a:xfrm>
+          <a:prstGeom prst="rect">
+            <a:avLst/>
+          </a:prstGeom>
+        </p:spPr>
+        <p:txBody>
+          <a:bodyPr anchorCtr="0" anchor="t" bIns="91425" lIns="91425" spcFirstLastPara="1" rIns="91425" wrap="square" tIns="91425">
+            <a:noAutofit/>
+          </a:bodyPr>
+          <a:lstStyle/>
+          <a:p>
+            <a:pPr indent="0" lvl="0" marL="0" rtl="0" algn="l">
+              <a:spcBef>
+                <a:spcPts val="0"/>
+              </a:spcBef>
+              <a:spcAft>
+                <a:spcPts val="0"/>
+              </a:spcAft>
+              <a:buNone/>
+            </a:pPr>
+            <a:r>
+              <a:rPr lang="en"/>
               <a:t>MassMine Integration Analysis</a:t>
             </a:r>
             <a:endParaRPr/>
@@ -10951,7 +11141,7 @@
       </p:sp>
       <p:sp>
         <p:nvSpPr>
-          <p:cNvPr id="210" name="Google Shape;210;p24"/>
+          <p:cNvPr id="217" name="Google Shape;217;p25"/>
           <p:cNvSpPr txBox="1"/>
           <p:nvPr>
             <p:ph idx="1" type="body"/>
@@ -11032,12 +11222,12 @@
 </p:sld>
 </file>
 
-<file path=ppt/slides/slide13.xml><?xml version="1.0" encoding="utf-8"?>
+<file path=ppt/slides/slide14.xml><?xml version="1.0" encoding="utf-8"?>
 <p:sld xmlns:a="http://schemas.openxmlformats.org/drawingml/2006/main" xmlns:r="http://schemas.openxmlformats.org/officeDocument/2006/relationships" xmlns:mc="http://schemas.openxmlformats.org/markup-compatibility/2006" xmlns:mv="urn:schemas-microsoft-com:mac:vml" xmlns:p="http://schemas.openxmlformats.org/presentationml/2006/main" xmlns:c="http://schemas.openxmlformats.org/drawingml/2006/chart" xmlns:dgm="http://schemas.openxmlformats.org/drawingml/2006/diagram" xmlns:o="urn:schemas-microsoft-com:office:office" xmlns:v="urn:schemas-microsoft-com:vml" xmlns:pvml="urn:schemas-microsoft-com:office:powerpoint" xmlns:com="http://schemas.openxmlformats.org/drawingml/2006/compatibility" xmlns:p14="http://schemas.microsoft.com/office/powerpoint/2010/main" xmlns:p15="http://schemas.microsoft.com/office/powerpoint/2012/main">
   <p:cSld>
     <p:spTree>
       <p:nvGrpSpPr>
-        <p:cNvPr id="214" name="Shape 214"/>
+        <p:cNvPr id="221" name="Shape 221"/>
         <p:cNvGrpSpPr/>
         <p:nvPr/>
       </p:nvGrpSpPr>
@@ -11051,7 +11241,7 @@
       </p:grpSpPr>
       <p:sp>
         <p:nvSpPr>
-          <p:cNvPr id="215" name="Google Shape;215;p25"/>
+          <p:cNvPr id="222" name="Google Shape;222;p26"/>
           <p:cNvSpPr txBox="1"/>
           <p:nvPr>
             <p:ph type="title"/>
@@ -11091,7 +11281,7 @@
       </p:sp>
       <p:sp>
         <p:nvSpPr>
-          <p:cNvPr id="216" name="Google Shape;216;p25"/>
+          <p:cNvPr id="223" name="Google Shape;223;p26"/>
           <p:cNvSpPr txBox="1"/>
           <p:nvPr>
             <p:ph idx="1" type="body"/>
@@ -11131,7 +11321,7 @@
       </p:sp>
       <p:sp>
         <p:nvSpPr>
-          <p:cNvPr id="217" name="Google Shape;217;p25"/>
+          <p:cNvPr id="224" name="Google Shape;224;p26"/>
           <p:cNvSpPr txBox="1"/>
           <p:nvPr/>
         </p:nvSpPr>
@@ -11189,7 +11379,7 @@
       </p:sp>
       <p:pic>
         <p:nvPicPr>
-          <p:cNvPr id="218" name="Google Shape;218;p25"/>
+          <p:cNvPr id="225" name="Google Shape;225;p26"/>
           <p:cNvPicPr preferRelativeResize="0"/>
           <p:nvPr/>
         </p:nvPicPr>
@@ -11205,139 +11395,6 @@
           <a:xfrm>
             <a:off x="398688" y="1192525"/>
             <a:ext cx="6012926" cy="3749824"/>
-          </a:xfrm>
-          <a:prstGeom prst="rect">
-            <a:avLst/>
-          </a:prstGeom>
-          <a:noFill/>
-          <a:ln>
-            <a:noFill/>
-          </a:ln>
-        </p:spPr>
-      </p:pic>
-    </p:spTree>
-  </p:cSld>
-  <p:clrMapOvr>
-    <a:masterClrMapping/>
-  </p:clrMapOvr>
-</p:sld>
-</file>
-
-<file path=ppt/slides/slide14.xml><?xml version="1.0" encoding="utf-8"?>
-<p:sld xmlns:a="http://schemas.openxmlformats.org/drawingml/2006/main" xmlns:r="http://schemas.openxmlformats.org/officeDocument/2006/relationships" xmlns:mc="http://schemas.openxmlformats.org/markup-compatibility/2006" xmlns:mv="urn:schemas-microsoft-com:mac:vml" xmlns:p="http://schemas.openxmlformats.org/presentationml/2006/main" xmlns:c="http://schemas.openxmlformats.org/drawingml/2006/chart" xmlns:dgm="http://schemas.openxmlformats.org/drawingml/2006/diagram" xmlns:o="urn:schemas-microsoft-com:office:office" xmlns:v="urn:schemas-microsoft-com:vml" xmlns:pvml="urn:schemas-microsoft-com:office:powerpoint" xmlns:com="http://schemas.openxmlformats.org/drawingml/2006/compatibility" xmlns:p14="http://schemas.microsoft.com/office/powerpoint/2010/main" xmlns:p15="http://schemas.microsoft.com/office/powerpoint/2012/main">
-  <p:cSld>
-    <p:spTree>
-      <p:nvGrpSpPr>
-        <p:cNvPr id="222" name="Shape 222"/>
-        <p:cNvGrpSpPr/>
-        <p:nvPr/>
-      </p:nvGrpSpPr>
-      <p:grpSpPr>
-        <a:xfrm>
-          <a:off x="0" y="0"/>
-          <a:ext cx="0" cy="0"/>
-          <a:chOff x="0" y="0"/>
-          <a:chExt cx="0" cy="0"/>
-        </a:xfrm>
-      </p:grpSpPr>
-      <p:sp>
-        <p:nvSpPr>
-          <p:cNvPr id="223" name="Google Shape;223;p26"/>
-          <p:cNvSpPr txBox="1"/>
-          <p:nvPr>
-            <p:ph type="title"/>
-          </p:nvPr>
-        </p:nvSpPr>
-        <p:spPr>
-          <a:xfrm>
-            <a:off x="1297500" y="393750"/>
-            <a:ext cx="7038900" cy="914100"/>
-          </a:xfrm>
-          <a:prstGeom prst="rect">
-            <a:avLst/>
-          </a:prstGeom>
-        </p:spPr>
-        <p:txBody>
-          <a:bodyPr anchorCtr="0" anchor="t" bIns="91425" lIns="91425" spcFirstLastPara="1" rIns="91425" wrap="square" tIns="91425">
-            <a:noAutofit/>
-          </a:bodyPr>
-          <a:lstStyle/>
-          <a:p>
-            <a:pPr indent="0" lvl="0" marL="0" rtl="0" algn="l">
-              <a:spcBef>
-                <a:spcPts val="0"/>
-              </a:spcBef>
-              <a:spcAft>
-                <a:spcPts val="0"/>
-              </a:spcAft>
-              <a:buNone/>
-            </a:pPr>
-            <a:r>
-              <a:rPr lang="en"/>
-              <a:t>ER model</a:t>
-            </a:r>
-            <a:endParaRPr/>
-          </a:p>
-        </p:txBody>
-      </p:sp>
-      <p:sp>
-        <p:nvSpPr>
-          <p:cNvPr id="224" name="Google Shape;224;p26"/>
-          <p:cNvSpPr txBox="1"/>
-          <p:nvPr>
-            <p:ph idx="1" type="body"/>
-          </p:nvPr>
-        </p:nvSpPr>
-        <p:spPr>
-          <a:xfrm>
-            <a:off x="2631275" y="2533325"/>
-            <a:ext cx="2505300" cy="914100"/>
-          </a:xfrm>
-          <a:prstGeom prst="rect">
-            <a:avLst/>
-          </a:prstGeom>
-        </p:spPr>
-        <p:txBody>
-          <a:bodyPr anchorCtr="0" anchor="t" bIns="91425" lIns="91425" spcFirstLastPara="1" rIns="91425" wrap="square" tIns="91425">
-            <a:noAutofit/>
-          </a:bodyPr>
-          <a:lstStyle/>
-          <a:p>
-            <a:pPr indent="0" lvl="0" marL="0" rtl="0" algn="l">
-              <a:spcBef>
-                <a:spcPts val="0"/>
-              </a:spcBef>
-              <a:spcAft>
-                <a:spcPts val="1600"/>
-              </a:spcAft>
-              <a:buNone/>
-            </a:pPr>
-            <a:r>
-              <a:rPr lang="en"/>
-              <a:t>  </a:t>
-            </a:r>
-            <a:endParaRPr/>
-          </a:p>
-        </p:txBody>
-      </p:sp>
-      <p:pic>
-        <p:nvPicPr>
-          <p:cNvPr id="225" name="Google Shape;225;p26"/>
-          <p:cNvPicPr preferRelativeResize="0"/>
-          <p:nvPr/>
-        </p:nvPicPr>
-        <p:blipFill>
-          <a:blip r:embed="rId3">
-            <a:alphaModFix/>
-          </a:blip>
-          <a:stretch>
-            <a:fillRect/>
-          </a:stretch>
-        </p:blipFill>
-        <p:spPr>
-          <a:xfrm>
-            <a:off x="1297500" y="1307850"/>
-            <a:ext cx="4407634" cy="3587151"/>
           </a:xfrm>
           <a:prstGeom prst="rect">
             <a:avLst/>
@@ -11983,6 +12040,139 @@
             </a:pPr>
             <a:r>
               <a:rPr lang="en"/>
+              <a:t>ER model</a:t>
+            </a:r>
+            <a:endParaRPr/>
+          </a:p>
+        </p:txBody>
+      </p:sp>
+      <p:sp>
+        <p:nvSpPr>
+          <p:cNvPr id="147" name="Google Shape;147;p15"/>
+          <p:cNvSpPr txBox="1"/>
+          <p:nvPr>
+            <p:ph idx="1" type="body"/>
+          </p:nvPr>
+        </p:nvSpPr>
+        <p:spPr>
+          <a:xfrm>
+            <a:off x="2631275" y="2533325"/>
+            <a:ext cx="2505300" cy="914100"/>
+          </a:xfrm>
+          <a:prstGeom prst="rect">
+            <a:avLst/>
+          </a:prstGeom>
+        </p:spPr>
+        <p:txBody>
+          <a:bodyPr anchorCtr="0" anchor="t" bIns="91425" lIns="91425" spcFirstLastPara="1" rIns="91425" wrap="square" tIns="91425">
+            <a:noAutofit/>
+          </a:bodyPr>
+          <a:lstStyle/>
+          <a:p>
+            <a:pPr indent="0" lvl="0" marL="0" rtl="0" algn="l">
+              <a:spcBef>
+                <a:spcPts val="0"/>
+              </a:spcBef>
+              <a:spcAft>
+                <a:spcPts val="1600"/>
+              </a:spcAft>
+              <a:buNone/>
+            </a:pPr>
+            <a:r>
+              <a:rPr lang="en"/>
+              <a:t>  </a:t>
+            </a:r>
+            <a:endParaRPr/>
+          </a:p>
+        </p:txBody>
+      </p:sp>
+      <p:pic>
+        <p:nvPicPr>
+          <p:cNvPr id="148" name="Google Shape;148;p15"/>
+          <p:cNvPicPr preferRelativeResize="0"/>
+          <p:nvPr/>
+        </p:nvPicPr>
+        <p:blipFill>
+          <a:blip r:embed="rId3">
+            <a:alphaModFix/>
+          </a:blip>
+          <a:stretch>
+            <a:fillRect/>
+          </a:stretch>
+        </p:blipFill>
+        <p:spPr>
+          <a:xfrm>
+            <a:off x="1297500" y="1307850"/>
+            <a:ext cx="4407634" cy="3587151"/>
+          </a:xfrm>
+          <a:prstGeom prst="rect">
+            <a:avLst/>
+          </a:prstGeom>
+          <a:noFill/>
+          <a:ln>
+            <a:noFill/>
+          </a:ln>
+        </p:spPr>
+      </p:pic>
+    </p:spTree>
+  </p:cSld>
+  <p:clrMapOvr>
+    <a:masterClrMapping/>
+  </p:clrMapOvr>
+</p:sld>
+</file>
+
+<file path=ppt/slides/slide4.xml><?xml version="1.0" encoding="utf-8"?>
+<p:sld xmlns:a="http://schemas.openxmlformats.org/drawingml/2006/main" xmlns:r="http://schemas.openxmlformats.org/officeDocument/2006/relationships" xmlns:mc="http://schemas.openxmlformats.org/markup-compatibility/2006" xmlns:mv="urn:schemas-microsoft-com:mac:vml" xmlns:p="http://schemas.openxmlformats.org/presentationml/2006/main" xmlns:c="http://schemas.openxmlformats.org/drawingml/2006/chart" xmlns:dgm="http://schemas.openxmlformats.org/drawingml/2006/diagram" xmlns:o="urn:schemas-microsoft-com:office:office" xmlns:v="urn:schemas-microsoft-com:vml" xmlns:pvml="urn:schemas-microsoft-com:office:powerpoint" xmlns:com="http://schemas.openxmlformats.org/drawingml/2006/compatibility" xmlns:p14="http://schemas.microsoft.com/office/powerpoint/2010/main" xmlns:p15="http://schemas.microsoft.com/office/powerpoint/2012/main">
+  <p:cSld>
+    <p:spTree>
+      <p:nvGrpSpPr>
+        <p:cNvPr id="152" name="Shape 152"/>
+        <p:cNvGrpSpPr/>
+        <p:nvPr/>
+      </p:nvGrpSpPr>
+      <p:grpSpPr>
+        <a:xfrm>
+          <a:off x="0" y="0"/>
+          <a:ext cx="0" cy="0"/>
+          <a:chOff x="0" y="0"/>
+          <a:chExt cx="0" cy="0"/>
+        </a:xfrm>
+      </p:grpSpPr>
+      <p:sp>
+        <p:nvSpPr>
+          <p:cNvPr id="153" name="Google Shape;153;p16"/>
+          <p:cNvSpPr txBox="1"/>
+          <p:nvPr>
+            <p:ph type="title"/>
+          </p:nvPr>
+        </p:nvSpPr>
+        <p:spPr>
+          <a:xfrm>
+            <a:off x="1297500" y="393750"/>
+            <a:ext cx="7038900" cy="914100"/>
+          </a:xfrm>
+          <a:prstGeom prst="rect">
+            <a:avLst/>
+          </a:prstGeom>
+        </p:spPr>
+        <p:txBody>
+          <a:bodyPr anchorCtr="0" anchor="t" bIns="91425" lIns="91425" spcFirstLastPara="1" rIns="91425" wrap="square" tIns="91425">
+            <a:noAutofit/>
+          </a:bodyPr>
+          <a:lstStyle/>
+          <a:p>
+            <a:pPr indent="0" lvl="0" marL="0" rtl="0" algn="l">
+              <a:spcBef>
+                <a:spcPts val="0"/>
+              </a:spcBef>
+              <a:spcAft>
+                <a:spcPts val="0"/>
+              </a:spcAft>
+              <a:buNone/>
+            </a:pPr>
+            <a:r>
+              <a:rPr lang="en"/>
               <a:t>Database Management Design</a:t>
             </a:r>
             <a:endParaRPr/>
@@ -11991,7 +12181,7 @@
       </p:sp>
       <p:sp>
         <p:nvSpPr>
-          <p:cNvPr id="147" name="Google Shape;147;p15"/>
+          <p:cNvPr id="154" name="Google Shape;154;p16"/>
           <p:cNvSpPr txBox="1"/>
           <p:nvPr>
             <p:ph idx="1" type="body"/>
@@ -12031,7 +12221,7 @@
       </p:sp>
       <p:pic>
         <p:nvPicPr>
-          <p:cNvPr id="148" name="Google Shape;148;p15"/>
+          <p:cNvPr id="155" name="Google Shape;155;p16"/>
           <p:cNvPicPr preferRelativeResize="0"/>
           <p:nvPr/>
         </p:nvPicPr>
@@ -12059,7 +12249,7 @@
       </p:pic>
       <p:sp>
         <p:nvSpPr>
-          <p:cNvPr id="149" name="Google Shape;149;p15"/>
+          <p:cNvPr id="156" name="Google Shape;156;p16"/>
           <p:cNvSpPr txBox="1"/>
           <p:nvPr/>
         </p:nvSpPr>
@@ -12351,12 +12541,12 @@
 </p:sld>
 </file>
 
-<file path=ppt/slides/slide4.xml><?xml version="1.0" encoding="utf-8"?>
+<file path=ppt/slides/slide5.xml><?xml version="1.0" encoding="utf-8"?>
 <p:sld xmlns:a="http://schemas.openxmlformats.org/drawingml/2006/main" xmlns:r="http://schemas.openxmlformats.org/officeDocument/2006/relationships" xmlns:mc="http://schemas.openxmlformats.org/markup-compatibility/2006" xmlns:mv="urn:schemas-microsoft-com:mac:vml" xmlns:p="http://schemas.openxmlformats.org/presentationml/2006/main" xmlns:c="http://schemas.openxmlformats.org/drawingml/2006/chart" xmlns:dgm="http://schemas.openxmlformats.org/drawingml/2006/diagram" xmlns:o="urn:schemas-microsoft-com:office:office" xmlns:v="urn:schemas-microsoft-com:vml" xmlns:pvml="urn:schemas-microsoft-com:office:powerpoint" xmlns:com="http://schemas.openxmlformats.org/drawingml/2006/compatibility" xmlns:p14="http://schemas.microsoft.com/office/powerpoint/2010/main" xmlns:p15="http://schemas.microsoft.com/office/powerpoint/2012/main">
   <p:cSld>
     <p:spTree>
       <p:nvGrpSpPr>
-        <p:cNvPr id="153" name="Shape 153"/>
+        <p:cNvPr id="160" name="Shape 160"/>
         <p:cNvGrpSpPr/>
         <p:nvPr/>
       </p:nvGrpSpPr>
@@ -12370,7 +12560,7 @@
       </p:grpSpPr>
       <p:sp>
         <p:nvSpPr>
-          <p:cNvPr id="154" name="Google Shape;154;p16"/>
+          <p:cNvPr id="161" name="Google Shape;161;p17"/>
           <p:cNvSpPr txBox="1"/>
           <p:nvPr>
             <p:ph type="title"/>
@@ -12410,7 +12600,7 @@
       </p:sp>
       <p:sp>
         <p:nvSpPr>
-          <p:cNvPr id="155" name="Google Shape;155;p16"/>
+          <p:cNvPr id="162" name="Google Shape;162;p17"/>
           <p:cNvSpPr txBox="1"/>
           <p:nvPr>
             <p:ph idx="1" type="body"/>
@@ -12500,139 +12690,6 @@
           </a:p>
         </p:txBody>
       </p:sp>
-    </p:spTree>
-  </p:cSld>
-  <p:clrMapOvr>
-    <a:masterClrMapping/>
-  </p:clrMapOvr>
-</p:sld>
-</file>
-
-<file path=ppt/slides/slide5.xml><?xml version="1.0" encoding="utf-8"?>
-<p:sld xmlns:a="http://schemas.openxmlformats.org/drawingml/2006/main" xmlns:r="http://schemas.openxmlformats.org/officeDocument/2006/relationships" xmlns:mc="http://schemas.openxmlformats.org/markup-compatibility/2006" xmlns:mv="urn:schemas-microsoft-com:mac:vml" xmlns:p="http://schemas.openxmlformats.org/presentationml/2006/main" xmlns:c="http://schemas.openxmlformats.org/drawingml/2006/chart" xmlns:dgm="http://schemas.openxmlformats.org/drawingml/2006/diagram" xmlns:o="urn:schemas-microsoft-com:office:office" xmlns:v="urn:schemas-microsoft-com:vml" xmlns:pvml="urn:schemas-microsoft-com:office:powerpoint" xmlns:com="http://schemas.openxmlformats.org/drawingml/2006/compatibility" xmlns:p14="http://schemas.microsoft.com/office/powerpoint/2010/main" xmlns:p15="http://schemas.microsoft.com/office/powerpoint/2012/main">
-  <p:cSld>
-    <p:spTree>
-      <p:nvGrpSpPr>
-        <p:cNvPr id="159" name="Shape 159"/>
-        <p:cNvGrpSpPr/>
-        <p:nvPr/>
-      </p:nvGrpSpPr>
-      <p:grpSpPr>
-        <a:xfrm>
-          <a:off x="0" y="0"/>
-          <a:ext cx="0" cy="0"/>
-          <a:chOff x="0" y="0"/>
-          <a:chExt cx="0" cy="0"/>
-        </a:xfrm>
-      </p:grpSpPr>
-      <p:sp>
-        <p:nvSpPr>
-          <p:cNvPr id="160" name="Google Shape;160;p17"/>
-          <p:cNvSpPr txBox="1"/>
-          <p:nvPr>
-            <p:ph type="title"/>
-          </p:nvPr>
-        </p:nvSpPr>
-        <p:spPr>
-          <a:xfrm>
-            <a:off x="1297500" y="393750"/>
-            <a:ext cx="7038900" cy="914100"/>
-          </a:xfrm>
-          <a:prstGeom prst="rect">
-            <a:avLst/>
-          </a:prstGeom>
-        </p:spPr>
-        <p:txBody>
-          <a:bodyPr anchorCtr="0" anchor="t" bIns="91425" lIns="91425" spcFirstLastPara="1" rIns="91425" wrap="square" tIns="91425">
-            <a:noAutofit/>
-          </a:bodyPr>
-          <a:lstStyle/>
-          <a:p>
-            <a:pPr indent="0" lvl="0" marL="0" rtl="0" algn="l">
-              <a:spcBef>
-                <a:spcPts val="0"/>
-              </a:spcBef>
-              <a:spcAft>
-                <a:spcPts val="0"/>
-              </a:spcAft>
-              <a:buNone/>
-            </a:pPr>
-            <a:r>
-              <a:rPr lang="en"/>
-              <a:t>Study creation (DBMT)</a:t>
-            </a:r>
-            <a:endParaRPr/>
-          </a:p>
-        </p:txBody>
-      </p:sp>
-      <p:sp>
-        <p:nvSpPr>
-          <p:cNvPr id="161" name="Google Shape;161;p17"/>
-          <p:cNvSpPr txBox="1"/>
-          <p:nvPr>
-            <p:ph idx="1" type="body"/>
-          </p:nvPr>
-        </p:nvSpPr>
-        <p:spPr>
-          <a:xfrm>
-            <a:off x="2226900" y="2126150"/>
-            <a:ext cx="3565800" cy="1563300"/>
-          </a:xfrm>
-          <a:prstGeom prst="rect">
-            <a:avLst/>
-          </a:prstGeom>
-        </p:spPr>
-        <p:txBody>
-          <a:bodyPr anchorCtr="0" anchor="t" bIns="91425" lIns="91425" spcFirstLastPara="1" rIns="91425" wrap="square" tIns="91425">
-            <a:noAutofit/>
-          </a:bodyPr>
-          <a:lstStyle/>
-          <a:p>
-            <a:pPr indent="0" lvl="0" marL="0" rtl="0" algn="l">
-              <a:spcBef>
-                <a:spcPts val="0"/>
-              </a:spcBef>
-              <a:spcAft>
-                <a:spcPts val="1600"/>
-              </a:spcAft>
-              <a:buNone/>
-            </a:pPr>
-            <a:r>
-              <a:rPr lang="en"/>
-              <a:t> </a:t>
-            </a:r>
-            <a:endParaRPr/>
-          </a:p>
-        </p:txBody>
-      </p:sp>
-      <p:pic>
-        <p:nvPicPr>
-          <p:cNvPr id="162" name="Google Shape;162;p17"/>
-          <p:cNvPicPr preferRelativeResize="0"/>
-          <p:nvPr/>
-        </p:nvPicPr>
-        <p:blipFill>
-          <a:blip r:embed="rId3">
-            <a:alphaModFix/>
-          </a:blip>
-          <a:stretch>
-            <a:fillRect/>
-          </a:stretch>
-        </p:blipFill>
-        <p:spPr>
-          <a:xfrm>
-            <a:off x="1297500" y="976750"/>
-            <a:ext cx="5045024" cy="3953550"/>
-          </a:xfrm>
-          <a:prstGeom prst="rect">
-            <a:avLst/>
-          </a:prstGeom>
-          <a:noFill/>
-          <a:ln>
-            <a:noFill/>
-          </a:ln>
-        </p:spPr>
-      </p:pic>
     </p:spTree>
   </p:cSld>
   <p:clrMapOvr>
@@ -12692,7 +12749,7 @@
             </a:pPr>
             <a:r>
               <a:rPr lang="en"/>
-              <a:t>Analysis Design </a:t>
+              <a:t>Study creation (DBMT)</a:t>
             </a:r>
             <a:endParaRPr/>
           </a:p>
@@ -12708,8 +12765,8 @@
         </p:nvSpPr>
         <p:spPr>
           <a:xfrm>
-            <a:off x="5568525" y="1058025"/>
-            <a:ext cx="3117000" cy="3630900"/>
+            <a:off x="2226900" y="2126150"/>
+            <a:ext cx="3565800" cy="1563300"/>
           </a:xfrm>
           <a:prstGeom prst="rect">
             <a:avLst/>
@@ -12726,97 +12783,13 @@
                 <a:spcPts val="0"/>
               </a:spcBef>
               <a:spcAft>
-                <a:spcPts val="0"/>
+                <a:spcPts val="1600"/>
               </a:spcAft>
               <a:buNone/>
             </a:pPr>
             <a:r>
               <a:rPr lang="en"/>
-              <a:t>Controls:</a:t>
-            </a:r>
-            <a:endParaRPr/>
-          </a:p>
-          <a:p>
-            <a:pPr indent="-311150" lvl="0" marL="457200" rtl="0" algn="l">
-              <a:spcBef>
-                <a:spcPts val="1600"/>
-              </a:spcBef>
-              <a:spcAft>
-                <a:spcPts val="0"/>
-              </a:spcAft>
-              <a:buSzPts val="1300"/>
-              <a:buChar char="●"/>
-            </a:pPr>
-            <a:r>
-              <a:rPr lang="en"/>
-              <a:t>User can’t write their analysis criteria outright</a:t>
-            </a:r>
-            <a:endParaRPr/>
-          </a:p>
-          <a:p>
-            <a:pPr indent="-311150" lvl="0" marL="457200" rtl="0" algn="l">
-              <a:spcBef>
-                <a:spcPts val="0"/>
-              </a:spcBef>
-              <a:spcAft>
-                <a:spcPts val="0"/>
-              </a:spcAft>
-              <a:buSzPts val="1300"/>
-              <a:buChar char="●"/>
-            </a:pPr>
-            <a:r>
-              <a:rPr lang="en"/>
-              <a:t>Tweets from other users’ studies may not be retrieved from database</a:t>
-            </a:r>
-            <a:endParaRPr/>
-          </a:p>
-          <a:p>
-            <a:pPr indent="0" lvl="0" marL="0" rtl="0" algn="l">
-              <a:spcBef>
-                <a:spcPts val="1600"/>
-              </a:spcBef>
-              <a:spcAft>
-                <a:spcPts val="0"/>
-              </a:spcAft>
-              <a:buNone/>
-            </a:pPr>
-            <a:r>
-              <a:rPr lang="en"/>
-              <a:t>Input/Output:</a:t>
-            </a:r>
-            <a:endParaRPr/>
-          </a:p>
-          <a:p>
-            <a:pPr indent="-311150" lvl="0" marL="457200" rtl="0" algn="l">
-              <a:spcBef>
-                <a:spcPts val="1600"/>
-              </a:spcBef>
-              <a:spcAft>
-                <a:spcPts val="0"/>
-              </a:spcAft>
-              <a:buSzPts val="1300"/>
-              <a:buChar char="●"/>
-            </a:pPr>
-            <a:r>
-              <a:rPr lang="en"/>
-              <a:t>In: Analysis requirements from user</a:t>
-            </a:r>
-            <a:endParaRPr/>
-          </a:p>
-          <a:p>
-            <a:pPr indent="-311150" lvl="0" marL="457200" rtl="0" algn="l">
-              <a:spcBef>
-                <a:spcPts val="0"/>
-              </a:spcBef>
-              <a:spcAft>
-                <a:spcPts val="0"/>
-              </a:spcAft>
-              <a:buSzPts val="1300"/>
-              <a:buChar char="●"/>
-            </a:pPr>
-            <a:r>
-              <a:rPr lang="en"/>
-              <a:t> Out: Prompt user for query, and the analysis results</a:t>
+              <a:t> </a:t>
             </a:r>
             <a:endParaRPr/>
           </a:p>
@@ -12838,8 +12811,8 @@
         </p:blipFill>
         <p:spPr>
           <a:xfrm>
-            <a:off x="1297500" y="1058025"/>
-            <a:ext cx="4061274" cy="3898550"/>
+            <a:off x="1297500" y="976750"/>
+            <a:ext cx="5045024" cy="3953550"/>
           </a:xfrm>
           <a:prstGeom prst="rect">
             <a:avLst/>
@@ -12909,6 +12882,223 @@
             </a:pPr>
             <a:r>
               <a:rPr lang="en"/>
+              <a:t>Analysis Design </a:t>
+            </a:r>
+            <a:endParaRPr/>
+          </a:p>
+        </p:txBody>
+      </p:sp>
+      <p:sp>
+        <p:nvSpPr>
+          <p:cNvPr id="175" name="Google Shape;175;p19"/>
+          <p:cNvSpPr txBox="1"/>
+          <p:nvPr>
+            <p:ph idx="1" type="body"/>
+          </p:nvPr>
+        </p:nvSpPr>
+        <p:spPr>
+          <a:xfrm>
+            <a:off x="5568525" y="1058025"/>
+            <a:ext cx="3117000" cy="3630900"/>
+          </a:xfrm>
+          <a:prstGeom prst="rect">
+            <a:avLst/>
+          </a:prstGeom>
+        </p:spPr>
+        <p:txBody>
+          <a:bodyPr anchorCtr="0" anchor="t" bIns="91425" lIns="91425" spcFirstLastPara="1" rIns="91425" wrap="square" tIns="91425">
+            <a:noAutofit/>
+          </a:bodyPr>
+          <a:lstStyle/>
+          <a:p>
+            <a:pPr indent="0" lvl="0" marL="0" rtl="0" algn="l">
+              <a:spcBef>
+                <a:spcPts val="0"/>
+              </a:spcBef>
+              <a:spcAft>
+                <a:spcPts val="0"/>
+              </a:spcAft>
+              <a:buNone/>
+            </a:pPr>
+            <a:r>
+              <a:rPr lang="en"/>
+              <a:t>Controls:</a:t>
+            </a:r>
+            <a:endParaRPr/>
+          </a:p>
+          <a:p>
+            <a:pPr indent="-311150" lvl="0" marL="457200" rtl="0" algn="l">
+              <a:spcBef>
+                <a:spcPts val="1600"/>
+              </a:spcBef>
+              <a:spcAft>
+                <a:spcPts val="0"/>
+              </a:spcAft>
+              <a:buSzPts val="1300"/>
+              <a:buChar char="●"/>
+            </a:pPr>
+            <a:r>
+              <a:rPr lang="en"/>
+              <a:t>User can’t write their analysis criteria outright</a:t>
+            </a:r>
+            <a:endParaRPr/>
+          </a:p>
+          <a:p>
+            <a:pPr indent="-311150" lvl="0" marL="457200" rtl="0" algn="l">
+              <a:spcBef>
+                <a:spcPts val="0"/>
+              </a:spcBef>
+              <a:spcAft>
+                <a:spcPts val="0"/>
+              </a:spcAft>
+              <a:buSzPts val="1300"/>
+              <a:buChar char="●"/>
+            </a:pPr>
+            <a:r>
+              <a:rPr lang="en"/>
+              <a:t>Tweets from other users’ studies may not be retrieved from database</a:t>
+            </a:r>
+            <a:endParaRPr/>
+          </a:p>
+          <a:p>
+            <a:pPr indent="0" lvl="0" marL="0" rtl="0" algn="l">
+              <a:spcBef>
+                <a:spcPts val="1600"/>
+              </a:spcBef>
+              <a:spcAft>
+                <a:spcPts val="0"/>
+              </a:spcAft>
+              <a:buNone/>
+            </a:pPr>
+            <a:r>
+              <a:rPr lang="en"/>
+              <a:t>Input/Output:</a:t>
+            </a:r>
+            <a:endParaRPr/>
+          </a:p>
+          <a:p>
+            <a:pPr indent="-311150" lvl="0" marL="457200" rtl="0" algn="l">
+              <a:spcBef>
+                <a:spcPts val="1600"/>
+              </a:spcBef>
+              <a:spcAft>
+                <a:spcPts val="0"/>
+              </a:spcAft>
+              <a:buSzPts val="1300"/>
+              <a:buChar char="●"/>
+            </a:pPr>
+            <a:r>
+              <a:rPr lang="en"/>
+              <a:t>In: Analysis requirements from user</a:t>
+            </a:r>
+            <a:endParaRPr/>
+          </a:p>
+          <a:p>
+            <a:pPr indent="-311150" lvl="0" marL="457200" rtl="0" algn="l">
+              <a:spcBef>
+                <a:spcPts val="0"/>
+              </a:spcBef>
+              <a:spcAft>
+                <a:spcPts val="0"/>
+              </a:spcAft>
+              <a:buSzPts val="1300"/>
+              <a:buChar char="●"/>
+            </a:pPr>
+            <a:r>
+              <a:rPr lang="en"/>
+              <a:t> Out: Prompt user for query, and the analysis results</a:t>
+            </a:r>
+            <a:endParaRPr/>
+          </a:p>
+        </p:txBody>
+      </p:sp>
+      <p:pic>
+        <p:nvPicPr>
+          <p:cNvPr id="176" name="Google Shape;176;p19"/>
+          <p:cNvPicPr preferRelativeResize="0"/>
+          <p:nvPr/>
+        </p:nvPicPr>
+        <p:blipFill>
+          <a:blip r:embed="rId3">
+            <a:alphaModFix/>
+          </a:blip>
+          <a:stretch>
+            <a:fillRect/>
+          </a:stretch>
+        </p:blipFill>
+        <p:spPr>
+          <a:xfrm>
+            <a:off x="1297500" y="1058025"/>
+            <a:ext cx="4061274" cy="3898550"/>
+          </a:xfrm>
+          <a:prstGeom prst="rect">
+            <a:avLst/>
+          </a:prstGeom>
+          <a:noFill/>
+          <a:ln>
+            <a:noFill/>
+          </a:ln>
+        </p:spPr>
+      </p:pic>
+    </p:spTree>
+  </p:cSld>
+  <p:clrMapOvr>
+    <a:masterClrMapping/>
+  </p:clrMapOvr>
+</p:sld>
+</file>
+
+<file path=ppt/slides/slide8.xml><?xml version="1.0" encoding="utf-8"?>
+<p:sld xmlns:a="http://schemas.openxmlformats.org/drawingml/2006/main" xmlns:r="http://schemas.openxmlformats.org/officeDocument/2006/relationships" xmlns:mc="http://schemas.openxmlformats.org/markup-compatibility/2006" xmlns:mv="urn:schemas-microsoft-com:mac:vml" xmlns:p="http://schemas.openxmlformats.org/presentationml/2006/main" xmlns:c="http://schemas.openxmlformats.org/drawingml/2006/chart" xmlns:dgm="http://schemas.openxmlformats.org/drawingml/2006/diagram" xmlns:o="urn:schemas-microsoft-com:office:office" xmlns:v="urn:schemas-microsoft-com:vml" xmlns:pvml="urn:schemas-microsoft-com:office:powerpoint" xmlns:com="http://schemas.openxmlformats.org/drawingml/2006/compatibility" xmlns:p14="http://schemas.microsoft.com/office/powerpoint/2010/main" xmlns:p15="http://schemas.microsoft.com/office/powerpoint/2012/main">
+  <p:cSld>
+    <p:spTree>
+      <p:nvGrpSpPr>
+        <p:cNvPr id="180" name="Shape 180"/>
+        <p:cNvGrpSpPr/>
+        <p:nvPr/>
+      </p:nvGrpSpPr>
+      <p:grpSpPr>
+        <a:xfrm>
+          <a:off x="0" y="0"/>
+          <a:ext cx="0" cy="0"/>
+          <a:chOff x="0" y="0"/>
+          <a:chExt cx="0" cy="0"/>
+        </a:xfrm>
+      </p:grpSpPr>
+      <p:sp>
+        <p:nvSpPr>
+          <p:cNvPr id="181" name="Google Shape;181;p20"/>
+          <p:cNvSpPr txBox="1"/>
+          <p:nvPr>
+            <p:ph type="title"/>
+          </p:nvPr>
+        </p:nvSpPr>
+        <p:spPr>
+          <a:xfrm>
+            <a:off x="1297500" y="393750"/>
+            <a:ext cx="7038900" cy="914100"/>
+          </a:xfrm>
+          <a:prstGeom prst="rect">
+            <a:avLst/>
+          </a:prstGeom>
+        </p:spPr>
+        <p:txBody>
+          <a:bodyPr anchorCtr="0" anchor="t" bIns="91425" lIns="91425" spcFirstLastPara="1" rIns="91425" wrap="square" tIns="91425">
+            <a:noAutofit/>
+          </a:bodyPr>
+          <a:lstStyle/>
+          <a:p>
+            <a:pPr indent="0" lvl="0" marL="0" rtl="0" algn="l">
+              <a:spcBef>
+                <a:spcPts val="0"/>
+              </a:spcBef>
+              <a:spcAft>
+                <a:spcPts val="0"/>
+              </a:spcAft>
+              <a:buNone/>
+            </a:pPr>
+            <a:r>
+              <a:rPr lang="en"/>
               <a:t>Analysis of Analysis Subsystem</a:t>
             </a:r>
             <a:endParaRPr/>
@@ -12917,7 +13107,7 @@
       </p:sp>
       <p:sp>
         <p:nvSpPr>
-          <p:cNvPr id="175" name="Google Shape;175;p19"/>
+          <p:cNvPr id="182" name="Google Shape;182;p20"/>
           <p:cNvSpPr txBox="1"/>
           <p:nvPr>
             <p:ph idx="1" type="body"/>
@@ -13014,12 +13204,12 @@
 </p:sld>
 </file>
 
-<file path=ppt/slides/slide8.xml><?xml version="1.0" encoding="utf-8"?>
+<file path=ppt/slides/slide9.xml><?xml version="1.0" encoding="utf-8"?>
 <p:sld xmlns:a="http://schemas.openxmlformats.org/drawingml/2006/main" xmlns:r="http://schemas.openxmlformats.org/officeDocument/2006/relationships" xmlns:mc="http://schemas.openxmlformats.org/markup-compatibility/2006" xmlns:mv="urn:schemas-microsoft-com:mac:vml" xmlns:p="http://schemas.openxmlformats.org/presentationml/2006/main" xmlns:c="http://schemas.openxmlformats.org/drawingml/2006/chart" xmlns:dgm="http://schemas.openxmlformats.org/drawingml/2006/diagram" xmlns:o="urn:schemas-microsoft-com:office:office" xmlns:v="urn:schemas-microsoft-com:vml" xmlns:pvml="urn:schemas-microsoft-com:office:powerpoint" xmlns:com="http://schemas.openxmlformats.org/drawingml/2006/compatibility" xmlns:p14="http://schemas.microsoft.com/office/powerpoint/2010/main" xmlns:p15="http://schemas.microsoft.com/office/powerpoint/2012/main">
   <p:cSld>
     <p:spTree>
       <p:nvGrpSpPr>
-        <p:cNvPr id="179" name="Shape 179"/>
+        <p:cNvPr id="186" name="Shape 186"/>
         <p:cNvGrpSpPr/>
         <p:nvPr/>
       </p:nvGrpSpPr>
@@ -13033,7 +13223,7 @@
       </p:grpSpPr>
       <p:sp>
         <p:nvSpPr>
-          <p:cNvPr id="180" name="Google Shape;180;p20"/>
+          <p:cNvPr id="187" name="Google Shape;187;p21"/>
           <p:cNvSpPr txBox="1"/>
           <p:nvPr>
             <p:ph type="title"/>
@@ -13073,7 +13263,7 @@
       </p:sp>
       <p:sp>
         <p:nvSpPr>
-          <p:cNvPr id="181" name="Google Shape;181;p20"/>
+          <p:cNvPr id="188" name="Google Shape;188;p21"/>
           <p:cNvSpPr txBox="1"/>
           <p:nvPr>
             <p:ph idx="1" type="body"/>
@@ -13112,7 +13302,7 @@
       </p:sp>
       <p:pic>
         <p:nvPicPr>
-          <p:cNvPr id="182" name="Google Shape;182;p20"/>
+          <p:cNvPr id="189" name="Google Shape;189;p21"/>
           <p:cNvPicPr preferRelativeResize="0"/>
           <p:nvPr/>
         </p:nvPicPr>
@@ -13140,7 +13330,7 @@
       </p:pic>
       <p:pic>
         <p:nvPicPr>
-          <p:cNvPr id="183" name="Google Shape;183;p20"/>
+          <p:cNvPr id="190" name="Google Shape;190;p21"/>
           <p:cNvPicPr preferRelativeResize="0"/>
           <p:nvPr/>
         </p:nvPicPr>
@@ -13174,197 +13364,286 @@
 </p:sld>
 </file>
 
-<file path=ppt/slides/slide9.xml><?xml version="1.0" encoding="utf-8"?>
-<p:sld xmlns:a="http://schemas.openxmlformats.org/drawingml/2006/main" xmlns:r="http://schemas.openxmlformats.org/officeDocument/2006/relationships" xmlns:mc="http://schemas.openxmlformats.org/markup-compatibility/2006" xmlns:mv="urn:schemas-microsoft-com:mac:vml" xmlns:p="http://schemas.openxmlformats.org/presentationml/2006/main" xmlns:c="http://schemas.openxmlformats.org/drawingml/2006/chart" xmlns:dgm="http://schemas.openxmlformats.org/drawingml/2006/diagram" xmlns:o="urn:schemas-microsoft-com:office:office" xmlns:v="urn:schemas-microsoft-com:vml" xmlns:pvml="urn:schemas-microsoft-com:office:powerpoint" xmlns:com="http://schemas.openxmlformats.org/drawingml/2006/compatibility" xmlns:p14="http://schemas.microsoft.com/office/powerpoint/2010/main" xmlns:p15="http://schemas.microsoft.com/office/powerpoint/2012/main">
-  <p:cSld>
-    <p:spTree>
-      <p:nvGrpSpPr>
-        <p:cNvPr id="187" name="Shape 187"/>
-        <p:cNvGrpSpPr/>
-        <p:nvPr/>
-      </p:nvGrpSpPr>
-      <p:grpSpPr>
-        <a:xfrm>
-          <a:off x="0" y="0"/>
-          <a:ext cx="0" cy="0"/>
-          <a:chOff x="0" y="0"/>
-          <a:chExt cx="0" cy="0"/>
-        </a:xfrm>
-      </p:grpSpPr>
-      <p:sp>
-        <p:nvSpPr>
-          <p:cNvPr id="188" name="Google Shape;188;p21"/>
-          <p:cNvSpPr txBox="1"/>
-          <p:nvPr>
-            <p:ph type="title"/>
-          </p:nvPr>
-        </p:nvSpPr>
-        <p:spPr>
-          <a:xfrm>
-            <a:off x="1297500" y="393750"/>
-            <a:ext cx="7038900" cy="914100"/>
-          </a:xfrm>
-          <a:prstGeom prst="rect">
-            <a:avLst/>
-          </a:prstGeom>
-        </p:spPr>
-        <p:txBody>
-          <a:bodyPr anchorCtr="0" anchor="t" bIns="91425" lIns="91425" spcFirstLastPara="1" rIns="91425" wrap="square" tIns="91425">
-            <a:noAutofit/>
-          </a:bodyPr>
-          <a:lstStyle/>
-          <a:p>
-            <a:pPr indent="0" lvl="0" marL="0" rtl="0" algn="l">
-              <a:spcBef>
-                <a:spcPts val="0"/>
-              </a:spcBef>
-              <a:spcAft>
-                <a:spcPts val="0"/>
-              </a:spcAft>
-              <a:buNone/>
-            </a:pPr>
-            <a:r>
-              <a:rPr lang="en"/>
-              <a:t>Web GUI Design</a:t>
-            </a:r>
-            <a:endParaRPr/>
-          </a:p>
-        </p:txBody>
-      </p:sp>
-      <p:sp>
-        <p:nvSpPr>
-          <p:cNvPr id="189" name="Google Shape;189;p21"/>
-          <p:cNvSpPr txBox="1"/>
-          <p:nvPr>
-            <p:ph idx="1" type="body"/>
-          </p:nvPr>
-        </p:nvSpPr>
-        <p:spPr>
-          <a:xfrm>
-            <a:off x="1297500" y="1567550"/>
-            <a:ext cx="2400300" cy="1126800"/>
-          </a:xfrm>
-          <a:prstGeom prst="rect">
-            <a:avLst/>
-          </a:prstGeom>
-        </p:spPr>
-        <p:txBody>
-          <a:bodyPr anchorCtr="0" anchor="t" bIns="91425" lIns="91425" spcFirstLastPara="1" rIns="91425" wrap="square" tIns="91425">
-            <a:noAutofit/>
-          </a:bodyPr>
-          <a:lstStyle/>
-          <a:p>
-            <a:pPr indent="0" lvl="0" marL="0" rtl="0" algn="l">
-              <a:spcBef>
-                <a:spcPts val="0"/>
-              </a:spcBef>
-              <a:spcAft>
-                <a:spcPts val="1600"/>
-              </a:spcAft>
-              <a:buNone/>
-            </a:pPr>
-            <a:r>
-              <a:t/>
-            </a:r>
-            <a:endParaRPr/>
-          </a:p>
-        </p:txBody>
-      </p:sp>
-      <p:pic>
-        <p:nvPicPr>
-          <p:cNvPr id="190" name="Google Shape;190;p21"/>
-          <p:cNvPicPr preferRelativeResize="0"/>
-          <p:nvPr/>
-        </p:nvPicPr>
-        <p:blipFill>
-          <a:blip r:embed="rId3">
-            <a:alphaModFix/>
-          </a:blip>
-          <a:stretch>
-            <a:fillRect/>
-          </a:stretch>
-        </p:blipFill>
-        <p:spPr>
-          <a:xfrm>
-            <a:off x="897275" y="1254538"/>
-            <a:ext cx="5943600" cy="2085975"/>
-          </a:xfrm>
-          <a:prstGeom prst="rect">
-            <a:avLst/>
-          </a:prstGeom>
-          <a:noFill/>
-          <a:ln>
-            <a:noFill/>
-          </a:ln>
-        </p:spPr>
-      </p:pic>
-      <p:sp>
-        <p:nvSpPr>
-          <p:cNvPr id="191" name="Google Shape;191;p21"/>
-          <p:cNvSpPr txBox="1"/>
-          <p:nvPr/>
-        </p:nvSpPr>
-        <p:spPr>
-          <a:xfrm>
-            <a:off x="956075" y="3461125"/>
-            <a:ext cx="7226100" cy="1289700"/>
-          </a:xfrm>
-          <a:prstGeom prst="rect">
-            <a:avLst/>
-          </a:prstGeom>
-          <a:noFill/>
-          <a:ln>
-            <a:noFill/>
-          </a:ln>
-        </p:spPr>
-        <p:txBody>
-          <a:bodyPr anchorCtr="0" anchor="t" bIns="91425" lIns="91425" spcFirstLastPara="1" rIns="91425" wrap="square" tIns="91425">
-            <a:noAutofit/>
-          </a:bodyPr>
-          <a:lstStyle/>
-          <a:p>
-            <a:pPr indent="0" lvl="0" marL="0" rtl="0" algn="l">
-              <a:spcBef>
-                <a:spcPts val="0"/>
-              </a:spcBef>
-              <a:spcAft>
-                <a:spcPts val="0"/>
-              </a:spcAft>
-              <a:buNone/>
-            </a:pPr>
-            <a:r>
-              <a:rPr lang="en">
-                <a:solidFill>
-                  <a:srgbClr val="FFFFFF"/>
-                </a:solidFill>
-                <a:latin typeface="Lato"/>
-                <a:ea typeface="Lato"/>
-                <a:cs typeface="Lato"/>
-                <a:sym typeface="Lato"/>
-              </a:rPr>
-              <a:t>Additional pages are the user management page, the query page, and the analysis page.</a:t>
-            </a:r>
-            <a:endParaRPr>
-              <a:solidFill>
-                <a:srgbClr val="FFFFFF"/>
-              </a:solidFill>
-              <a:latin typeface="Lato"/>
-              <a:ea typeface="Lato"/>
-              <a:cs typeface="Lato"/>
-              <a:sym typeface="Lato"/>
-            </a:endParaRPr>
-          </a:p>
-        </p:txBody>
-      </p:sp>
-    </p:spTree>
-  </p:cSld>
-  <p:clrMapOvr>
-    <a:masterClrMapping/>
-  </p:clrMapOvr>
-</p:sld>
+<file path=ppt/theme/theme1.xml><?xml version="1.0" encoding="utf-8"?>
+<a:theme xmlns:a="http://schemas.openxmlformats.org/drawingml/2006/main" xmlns:r="http://schemas.openxmlformats.org/officeDocument/2006/relationships" name="Focus">
+  <a:themeElements>
+    <a:clrScheme name="Focus">
+      <a:dk1>
+        <a:srgbClr val="1B212C"/>
+      </a:dk1>
+      <a:lt1>
+        <a:srgbClr val="FFFFFF"/>
+      </a:lt1>
+      <a:dk2>
+        <a:srgbClr val="D9D9D9"/>
+      </a:dk2>
+      <a:lt2>
+        <a:srgbClr val="82C7A5"/>
+      </a:lt2>
+      <a:accent1>
+        <a:srgbClr val="0145AC"/>
+      </a:accent1>
+      <a:accent2>
+        <a:srgbClr val="EECE1A"/>
+      </a:accent2>
+      <a:accent3>
+        <a:srgbClr val="4E5567"/>
+      </a:accent3>
+      <a:accent4>
+        <a:srgbClr val="F4D6AD"/>
+      </a:accent4>
+      <a:accent5>
+        <a:srgbClr val="7890CD"/>
+      </a:accent5>
+      <a:accent6>
+        <a:srgbClr val="F15E22"/>
+      </a:accent6>
+      <a:hlink>
+        <a:srgbClr val="7890CD"/>
+      </a:hlink>
+      <a:folHlink>
+        <a:srgbClr val="7890CD"/>
+      </a:folHlink>
+    </a:clrScheme>
+    <a:fontScheme name="Office">
+      <a:majorFont>
+        <a:latin typeface="Arial"/>
+        <a:ea typeface=""/>
+        <a:cs typeface=""/>
+        <a:font script="Jpan" typeface="ＭＳ Ｐゴシック"/>
+        <a:font script="Hang" typeface="맑은 고딕"/>
+        <a:font script="Hans" typeface="宋体"/>
+        <a:font script="Hant" typeface="新細明體"/>
+        <a:font script="Arab" typeface="Times New Roman"/>
+        <a:font script="Hebr" typeface="Times New Roman"/>
+        <a:font script="Thai" typeface="Angsana New"/>
+        <a:font script="Ethi" typeface="Nyala"/>
+        <a:font script="Beng" typeface="Vrinda"/>
+        <a:font script="Gujr" typeface="Shruti"/>
+        <a:font script="Khmr" typeface="MoolBoran"/>
+        <a:font script="Knda" typeface="Tunga"/>
+        <a:font script="Guru" typeface="Raavi"/>
+        <a:font script="Cans" typeface="Euphemia"/>
+        <a:font script="Cher" typeface="Plantagenet Cherokee"/>
+        <a:font script="Yiii" typeface="Microsoft Yi Baiti"/>
+        <a:font script="Tibt" typeface="Microsoft Himalaya"/>
+        <a:font script="Thaa" typeface="MV Boli"/>
+        <a:font script="Deva" typeface="Mangal"/>
+        <a:font script="Telu" typeface="Gautami"/>
+        <a:font script="Taml" typeface="Latha"/>
+        <a:font script="Syrc" typeface="Estrangelo Edessa"/>
+        <a:font script="Orya" typeface="Kalinga"/>
+        <a:font script="Mlym" typeface="Kartika"/>
+        <a:font script="Laoo" typeface="DokChampa"/>
+        <a:font script="Sinh" typeface="Iskoola Pota"/>
+        <a:font script="Mong" typeface="Mongolian Baiti"/>
+        <a:font script="Viet" typeface="Times New Roman"/>
+        <a:font script="Uigh" typeface="Microsoft Uighur"/>
+        <a:font script="Geor" typeface="Sylfaen"/>
+      </a:majorFont>
+      <a:minorFont>
+        <a:latin typeface="Arial"/>
+        <a:ea typeface=""/>
+        <a:cs typeface=""/>
+        <a:font script="Jpan" typeface="ＭＳ Ｐゴシック"/>
+        <a:font script="Hang" typeface="맑은 고딕"/>
+        <a:font script="Hans" typeface="宋体"/>
+        <a:font script="Hant" typeface="新細明體"/>
+        <a:font script="Arab" typeface="Arial"/>
+        <a:font script="Hebr" typeface="Arial"/>
+        <a:font script="Thai" typeface="Cordia New"/>
+        <a:font script="Ethi" typeface="Nyala"/>
+        <a:font script="Beng" typeface="Vrinda"/>
+        <a:font script="Gujr" typeface="Shruti"/>
+        <a:font script="Khmr" typeface="DaunPenh"/>
+        <a:font script="Knda" typeface="Tunga"/>
+        <a:font script="Guru" typeface="Raavi"/>
+        <a:font script="Cans" typeface="Euphemia"/>
+        <a:font script="Cher" typeface="Plantagenet Cherokee"/>
+        <a:font script="Yiii" typeface="Microsoft Yi Baiti"/>
+        <a:font script="Tibt" typeface="Microsoft Himalaya"/>
+        <a:font script="Thaa" typeface="MV Boli"/>
+        <a:font script="Deva" typeface="Mangal"/>
+        <a:font script="Telu" typeface="Gautami"/>
+        <a:font script="Taml" typeface="Latha"/>
+        <a:font script="Syrc" typeface="Estrangelo Edessa"/>
+        <a:font script="Orya" typeface="Kalinga"/>
+        <a:font script="Mlym" typeface="Kartika"/>
+        <a:font script="Laoo" typeface="DokChampa"/>
+        <a:font script="Sinh" typeface="Iskoola Pota"/>
+        <a:font script="Mong" typeface="Mongolian Baiti"/>
+        <a:font script="Viet" typeface="Arial"/>
+        <a:font script="Uigh" typeface="Microsoft Uighur"/>
+        <a:font script="Geor" typeface="Sylfaen"/>
+      </a:minorFont>
+    </a:fontScheme>
+    <a:fmtScheme name="Office">
+      <a:fillStyleLst>
+        <a:solidFill>
+          <a:schemeClr val="phClr"/>
+        </a:solidFill>
+        <a:gradFill rotWithShape="1">
+          <a:gsLst>
+            <a:gs pos="0">
+              <a:schemeClr val="phClr">
+                <a:tint val="50000"/>
+                <a:satMod val="300000"/>
+              </a:schemeClr>
+            </a:gs>
+            <a:gs pos="35000">
+              <a:schemeClr val="phClr">
+                <a:tint val="37000"/>
+                <a:satMod val="300000"/>
+              </a:schemeClr>
+            </a:gs>
+            <a:gs pos="100000">
+              <a:schemeClr val="phClr">
+                <a:tint val="15000"/>
+                <a:satMod val="350000"/>
+              </a:schemeClr>
+            </a:gs>
+          </a:gsLst>
+          <a:lin ang="16200000" scaled="1"/>
+        </a:gradFill>
+        <a:gradFill rotWithShape="1">
+          <a:gsLst>
+            <a:gs pos="0">
+              <a:schemeClr val="phClr">
+                <a:tint val="100000"/>
+                <a:shade val="100000"/>
+                <a:satMod val="130000"/>
+              </a:schemeClr>
+            </a:gs>
+            <a:gs pos="100000">
+              <a:schemeClr val="phClr">
+                <a:tint val="50000"/>
+                <a:shade val="100000"/>
+                <a:satMod val="350000"/>
+              </a:schemeClr>
+            </a:gs>
+          </a:gsLst>
+          <a:lin ang="16200000" scaled="0"/>
+        </a:gradFill>
+      </a:fillStyleLst>
+      <a:lnStyleLst>
+        <a:ln w="9525" cap="flat" cmpd="sng" algn="ctr">
+          <a:solidFill>
+            <a:schemeClr val="phClr">
+              <a:shade val="95000"/>
+              <a:satMod val="105000"/>
+            </a:schemeClr>
+          </a:solidFill>
+          <a:prstDash val="solid"/>
+        </a:ln>
+        <a:ln w="25400" cap="flat" cmpd="sng" algn="ctr">
+          <a:solidFill>
+            <a:schemeClr val="phClr"/>
+          </a:solidFill>
+          <a:prstDash val="solid"/>
+        </a:ln>
+        <a:ln w="38100" cap="flat" cmpd="sng" algn="ctr">
+          <a:solidFill>
+            <a:schemeClr val="phClr"/>
+          </a:solidFill>
+          <a:prstDash val="solid"/>
+        </a:ln>
+      </a:lnStyleLst>
+      <a:effectStyleLst>
+        <a:effectStyle>
+          <a:effectLst>
+            <a:outerShdw blurRad="40000" dist="20000" dir="5400000" rotWithShape="0">
+              <a:srgbClr val="000000">
+                <a:alpha val="38000"/>
+              </a:srgbClr>
+            </a:outerShdw>
+          </a:effectLst>
+        </a:effectStyle>
+        <a:effectStyle>
+          <a:effectLst>
+            <a:outerShdw blurRad="40000" dist="23000" dir="5400000" rotWithShape="0">
+              <a:srgbClr val="000000">
+                <a:alpha val="35000"/>
+              </a:srgbClr>
+            </a:outerShdw>
+          </a:effectLst>
+        </a:effectStyle>
+        <a:effectStyle>
+          <a:effectLst>
+            <a:outerShdw blurRad="40000" dist="23000" dir="5400000" rotWithShape="0">
+              <a:srgbClr val="000000">
+                <a:alpha val="35000"/>
+              </a:srgbClr>
+            </a:outerShdw>
+          </a:effectLst>
+          <a:scene3d>
+            <a:camera prst="orthographicFront">
+              <a:rot lat="0" lon="0" rev="0"/>
+            </a:camera>
+            <a:lightRig rig="threePt" dir="t">
+              <a:rot lat="0" lon="0" rev="1200000"/>
+            </a:lightRig>
+          </a:scene3d>
+          <a:sp3d>
+            <a:bevelT w="63500" h="25400"/>
+          </a:sp3d>
+        </a:effectStyle>
+      </a:effectStyleLst>
+      <a:bgFillStyleLst>
+        <a:solidFill>
+          <a:schemeClr val="phClr"/>
+        </a:solidFill>
+        <a:gradFill rotWithShape="1">
+          <a:gsLst>
+            <a:gs pos="0">
+              <a:schemeClr val="phClr">
+                <a:tint val="40000"/>
+                <a:satMod val="350000"/>
+              </a:schemeClr>
+            </a:gs>
+            <a:gs pos="40000">
+              <a:schemeClr val="phClr">
+                <a:tint val="45000"/>
+                <a:shade val="99000"/>
+                <a:satMod val="350000"/>
+              </a:schemeClr>
+            </a:gs>
+            <a:gs pos="100000">
+              <a:schemeClr val="phClr">
+                <a:shade val="20000"/>
+                <a:satMod val="255000"/>
+              </a:schemeClr>
+            </a:gs>
+          </a:gsLst>
+          <a:path path="circle">
+            <a:fillToRect l="50000" t="-80000" r="50000" b="180000"/>
+          </a:path>
+        </a:gradFill>
+        <a:gradFill rotWithShape="1">
+          <a:gsLst>
+            <a:gs pos="0">
+              <a:schemeClr val="phClr">
+                <a:tint val="80000"/>
+                <a:satMod val="300000"/>
+              </a:schemeClr>
+            </a:gs>
+            <a:gs pos="100000">
+              <a:schemeClr val="phClr">
+                <a:shade val="30000"/>
+                <a:satMod val="200000"/>
+              </a:schemeClr>
+            </a:gs>
+          </a:gsLst>
+          <a:path path="circle">
+            <a:fillToRect l="50000" t="50000" r="50000" b="50000"/>
+          </a:path>
+        </a:gradFill>
+      </a:bgFillStyleLst>
+    </a:fmtScheme>
+  </a:themeElements>
+</a:theme>
 </file>
 
-<file path=ppt/theme/theme1.xml><?xml version="1.0" encoding="utf-8"?>
+<file path=ppt/theme/theme2.xml><?xml version="1.0" encoding="utf-8"?>
 <a:theme xmlns:a="http://schemas.openxmlformats.org/drawingml/2006/main" xmlns:r="http://schemas.openxmlformats.org/officeDocument/2006/relationships">
   <a:themeElements>
     <a:clrScheme name="Default">
@@ -13641,283 +13920,4 @@
     </a:fmtScheme>
   </a:themeElements>
 </a:theme>
-</file>
-
-<file path=ppt/theme/theme2.xml><?xml version="1.0" encoding="utf-8"?>
-<a:theme xmlns:a="http://schemas.openxmlformats.org/drawingml/2006/main" xmlns:r="http://schemas.openxmlformats.org/officeDocument/2006/relationships" name="Focus">
-  <a:themeElements>
-    <a:clrScheme name="Focus">
-      <a:dk1>
-        <a:srgbClr val="1B212C"/>
-      </a:dk1>
-      <a:lt1>
-        <a:srgbClr val="FFFFFF"/>
-      </a:lt1>
-      <a:dk2>
-        <a:srgbClr val="D9D9D9"/>
-      </a:dk2>
-      <a:lt2>
-        <a:srgbClr val="82C7A5"/>
-      </a:lt2>
-      <a:accent1>
-        <a:srgbClr val="0145AC"/>
-      </a:accent1>
-      <a:accent2>
-        <a:srgbClr val="EECE1A"/>
-      </a:accent2>
-      <a:accent3>
-        <a:srgbClr val="4E5567"/>
-      </a:accent3>
-      <a:accent4>
-        <a:srgbClr val="F4D6AD"/>
-      </a:accent4>
-      <a:accent5>
-        <a:srgbClr val="7890CD"/>
-      </a:accent5>
-      <a:accent6>
-        <a:srgbClr val="F15E22"/>
-      </a:accent6>
-      <a:hlink>
-        <a:srgbClr val="7890CD"/>
-      </a:hlink>
-      <a:folHlink>
-        <a:srgbClr val="7890CD"/>
-      </a:folHlink>
-    </a:clrScheme>
-    <a:fontScheme name="Office">
-      <a:majorFont>
-        <a:latin typeface="Arial"/>
-        <a:ea typeface=""/>
-        <a:cs typeface=""/>
-        <a:font script="Jpan" typeface="ＭＳ Ｐゴシック"/>
-        <a:font script="Hang" typeface="맑은 고딕"/>
-        <a:font script="Hans" typeface="宋体"/>
-        <a:font script="Hant" typeface="新細明體"/>
-        <a:font script="Arab" typeface="Times New Roman"/>
-        <a:font script="Hebr" typeface="Times New Roman"/>
-        <a:font script="Thai" typeface="Angsana New"/>
-        <a:font script="Ethi" typeface="Nyala"/>
-        <a:font script="Beng" typeface="Vrinda"/>
-        <a:font script="Gujr" typeface="Shruti"/>
-        <a:font script="Khmr" typeface="MoolBoran"/>
-        <a:font script="Knda" typeface="Tunga"/>
-        <a:font script="Guru" typeface="Raavi"/>
-        <a:font script="Cans" typeface="Euphemia"/>
-        <a:font script="Cher" typeface="Plantagenet Cherokee"/>
-        <a:font script="Yiii" typeface="Microsoft Yi Baiti"/>
-        <a:font script="Tibt" typeface="Microsoft Himalaya"/>
-        <a:font script="Thaa" typeface="MV Boli"/>
-        <a:font script="Deva" typeface="Mangal"/>
-        <a:font script="Telu" typeface="Gautami"/>
-        <a:font script="Taml" typeface="Latha"/>
-        <a:font script="Syrc" typeface="Estrangelo Edessa"/>
-        <a:font script="Orya" typeface="Kalinga"/>
-        <a:font script="Mlym" typeface="Kartika"/>
-        <a:font script="Laoo" typeface="DokChampa"/>
-        <a:font script="Sinh" typeface="Iskoola Pota"/>
-        <a:font script="Mong" typeface="Mongolian Baiti"/>
-        <a:font script="Viet" typeface="Times New Roman"/>
-        <a:font script="Uigh" typeface="Microsoft Uighur"/>
-        <a:font script="Geor" typeface="Sylfaen"/>
-      </a:majorFont>
-      <a:minorFont>
-        <a:latin typeface="Arial"/>
-        <a:ea typeface=""/>
-        <a:cs typeface=""/>
-        <a:font script="Jpan" typeface="ＭＳ Ｐゴシック"/>
-        <a:font script="Hang" typeface="맑은 고딕"/>
-        <a:font script="Hans" typeface="宋体"/>
-        <a:font script="Hant" typeface="新細明體"/>
-        <a:font script="Arab" typeface="Arial"/>
-        <a:font script="Hebr" typeface="Arial"/>
-        <a:font script="Thai" typeface="Cordia New"/>
-        <a:font script="Ethi" typeface="Nyala"/>
-        <a:font script="Beng" typeface="Vrinda"/>
-        <a:font script="Gujr" typeface="Shruti"/>
-        <a:font script="Khmr" typeface="DaunPenh"/>
-        <a:font script="Knda" typeface="Tunga"/>
-        <a:font script="Guru" typeface="Raavi"/>
-        <a:font script="Cans" typeface="Euphemia"/>
-        <a:font script="Cher" typeface="Plantagenet Cherokee"/>
-        <a:font script="Yiii" typeface="Microsoft Yi Baiti"/>
-        <a:font script="Tibt" typeface="Microsoft Himalaya"/>
-        <a:font script="Thaa" typeface="MV Boli"/>
-        <a:font script="Deva" typeface="Mangal"/>
-        <a:font script="Telu" typeface="Gautami"/>
-        <a:font script="Taml" typeface="Latha"/>
-        <a:font script="Syrc" typeface="Estrangelo Edessa"/>
-        <a:font script="Orya" typeface="Kalinga"/>
-        <a:font script="Mlym" typeface="Kartika"/>
-        <a:font script="Laoo" typeface="DokChampa"/>
-        <a:font script="Sinh" typeface="Iskoola Pota"/>
-        <a:font script="Mong" typeface="Mongolian Baiti"/>
-        <a:font script="Viet" typeface="Arial"/>
-        <a:font script="Uigh" typeface="Microsoft Uighur"/>
-        <a:font script="Geor" typeface="Sylfaen"/>
-      </a:minorFont>
-    </a:fontScheme>
-    <a:fmtScheme name="Office">
-      <a:fillStyleLst>
-        <a:solidFill>
-          <a:schemeClr val="phClr"/>
-        </a:solidFill>
-        <a:gradFill rotWithShape="1">
-          <a:gsLst>
-            <a:gs pos="0">
-              <a:schemeClr val="phClr">
-                <a:tint val="50000"/>
-                <a:satMod val="300000"/>
-              </a:schemeClr>
-            </a:gs>
-            <a:gs pos="35000">
-              <a:schemeClr val="phClr">
-                <a:tint val="37000"/>
-                <a:satMod val="300000"/>
-              </a:schemeClr>
-            </a:gs>
-            <a:gs pos="100000">
-              <a:schemeClr val="phClr">
-                <a:tint val="15000"/>
-                <a:satMod val="350000"/>
-              </a:schemeClr>
-            </a:gs>
-          </a:gsLst>
-          <a:lin ang="16200000" scaled="1"/>
-        </a:gradFill>
-        <a:gradFill rotWithShape="1">
-          <a:gsLst>
-            <a:gs pos="0">
-              <a:schemeClr val="phClr">
-                <a:tint val="100000"/>
-                <a:shade val="100000"/>
-                <a:satMod val="130000"/>
-              </a:schemeClr>
-            </a:gs>
-            <a:gs pos="100000">
-              <a:schemeClr val="phClr">
-                <a:tint val="50000"/>
-                <a:shade val="100000"/>
-                <a:satMod val="350000"/>
-              </a:schemeClr>
-            </a:gs>
-          </a:gsLst>
-          <a:lin ang="16200000" scaled="0"/>
-        </a:gradFill>
-      </a:fillStyleLst>
-      <a:lnStyleLst>
-        <a:ln w="9525" cap="flat" cmpd="sng" algn="ctr">
-          <a:solidFill>
-            <a:schemeClr val="phClr">
-              <a:shade val="95000"/>
-              <a:satMod val="105000"/>
-            </a:schemeClr>
-          </a:solidFill>
-          <a:prstDash val="solid"/>
-        </a:ln>
-        <a:ln w="25400" cap="flat" cmpd="sng" algn="ctr">
-          <a:solidFill>
-            <a:schemeClr val="phClr"/>
-          </a:solidFill>
-          <a:prstDash val="solid"/>
-        </a:ln>
-        <a:ln w="38100" cap="flat" cmpd="sng" algn="ctr">
-          <a:solidFill>
-            <a:schemeClr val="phClr"/>
-          </a:solidFill>
-          <a:prstDash val="solid"/>
-        </a:ln>
-      </a:lnStyleLst>
-      <a:effectStyleLst>
-        <a:effectStyle>
-          <a:effectLst>
-            <a:outerShdw blurRad="40000" dist="20000" dir="5400000" rotWithShape="0">
-              <a:srgbClr val="000000">
-                <a:alpha val="38000"/>
-              </a:srgbClr>
-            </a:outerShdw>
-          </a:effectLst>
-        </a:effectStyle>
-        <a:effectStyle>
-          <a:effectLst>
-            <a:outerShdw blurRad="40000" dist="23000" dir="5400000" rotWithShape="0">
-              <a:srgbClr val="000000">
-                <a:alpha val="35000"/>
-              </a:srgbClr>
-            </a:outerShdw>
-          </a:effectLst>
-        </a:effectStyle>
-        <a:effectStyle>
-          <a:effectLst>
-            <a:outerShdw blurRad="40000" dist="23000" dir="5400000" rotWithShape="0">
-              <a:srgbClr val="000000">
-                <a:alpha val="35000"/>
-              </a:srgbClr>
-            </a:outerShdw>
-          </a:effectLst>
-          <a:scene3d>
-            <a:camera prst="orthographicFront">
-              <a:rot lat="0" lon="0" rev="0"/>
-            </a:camera>
-            <a:lightRig rig="threePt" dir="t">
-              <a:rot lat="0" lon="0" rev="1200000"/>
-            </a:lightRig>
-          </a:scene3d>
-          <a:sp3d>
-            <a:bevelT w="63500" h="25400"/>
-          </a:sp3d>
-        </a:effectStyle>
-      </a:effectStyleLst>
-      <a:bgFillStyleLst>
-        <a:solidFill>
-          <a:schemeClr val="phClr"/>
-        </a:solidFill>
-        <a:gradFill rotWithShape="1">
-          <a:gsLst>
-            <a:gs pos="0">
-              <a:schemeClr val="phClr">
-                <a:tint val="40000"/>
-                <a:satMod val="350000"/>
-              </a:schemeClr>
-            </a:gs>
-            <a:gs pos="40000">
-              <a:schemeClr val="phClr">
-                <a:tint val="45000"/>
-                <a:shade val="99000"/>
-                <a:satMod val="350000"/>
-              </a:schemeClr>
-            </a:gs>
-            <a:gs pos="100000">
-              <a:schemeClr val="phClr">
-                <a:shade val="20000"/>
-                <a:satMod val="255000"/>
-              </a:schemeClr>
-            </a:gs>
-          </a:gsLst>
-          <a:path path="circle">
-            <a:fillToRect l="50000" t="-80000" r="50000" b="180000"/>
-          </a:path>
-        </a:gradFill>
-        <a:gradFill rotWithShape="1">
-          <a:gsLst>
-            <a:gs pos="0">
-              <a:schemeClr val="phClr">
-                <a:tint val="80000"/>
-                <a:satMod val="300000"/>
-              </a:schemeClr>
-            </a:gs>
-            <a:gs pos="100000">
-              <a:schemeClr val="phClr">
-                <a:shade val="30000"/>
-                <a:satMod val="200000"/>
-              </a:schemeClr>
-            </a:gs>
-          </a:gsLst>
-          <a:path path="circle">
-            <a:fillToRect l="50000" t="50000" r="50000" b="50000"/>
-          </a:path>
-        </a:gradFill>
-      </a:bgFillStyleLst>
-    </a:fmtScheme>
-  </a:themeElements>
-</a:theme>
 </file>
</xml_diff>